<commit_message>
P.Á ppt védés kész
</commit_message>
<xml_diff>
--- a/Petró_Ádám_Védés.pptx
+++ b/Petró_Ádám_Védés.pptx
@@ -5,7 +5,7 @@
     <p:sldMasterId id="2147483692" r:id="rId1"/>
   </p:sldMasterIdLst>
   <p:notesMasterIdLst>
-    <p:notesMasterId r:id="rId9"/>
+    <p:notesMasterId r:id="rId10"/>
   </p:notesMasterIdLst>
   <p:sldIdLst>
     <p:sldId id="256" r:id="rId2"/>
@@ -13,33 +13,34 @@
     <p:sldId id="259" r:id="rId4"/>
     <p:sldId id="344" r:id="rId5"/>
     <p:sldId id="300" r:id="rId6"/>
-    <p:sldId id="343" r:id="rId7"/>
-    <p:sldId id="342" r:id="rId8"/>
+    <p:sldId id="345" r:id="rId7"/>
+    <p:sldId id="346" r:id="rId8"/>
+    <p:sldId id="342" r:id="rId9"/>
   </p:sldIdLst>
   <p:sldSz cx="9144000" cy="5143500" type="screen16x9"/>
   <p:notesSz cx="6858000" cy="9144000"/>
   <p:embeddedFontLst>
     <p:embeddedFont>
       <p:font typeface="Coming Soon" panose="020B0604020202020204" charset="0"/>
-      <p:regular r:id="rId10"/>
-    </p:embeddedFont>
-    <p:embeddedFont>
-      <p:font typeface="Concert One" panose="020B0604020202020204" charset="0"/>
       <p:regular r:id="rId11"/>
     </p:embeddedFont>
     <p:embeddedFont>
-      <p:font typeface="Roboto Mono" panose="020B0604020202020204" charset="0"/>
+      <p:font typeface="Concert One" pitchFamily="2" charset="0"/>
       <p:regular r:id="rId12"/>
-      <p:bold r:id="rId13"/>
-      <p:italic r:id="rId14"/>
-      <p:boldItalic r:id="rId15"/>
     </p:embeddedFont>
     <p:embeddedFont>
-      <p:font typeface="Roboto Mono Medium" panose="020B0604020202020204" charset="0"/>
-      <p:regular r:id="rId16"/>
-      <p:bold r:id="rId17"/>
-      <p:italic r:id="rId18"/>
-      <p:boldItalic r:id="rId19"/>
+      <p:font typeface="Roboto Mono" panose="00000009000000000000" pitchFamily="49" charset="0"/>
+      <p:regular r:id="rId13"/>
+      <p:bold r:id="rId14"/>
+      <p:italic r:id="rId15"/>
+      <p:boldItalic r:id="rId16"/>
+    </p:embeddedFont>
+    <p:embeddedFont>
+      <p:font typeface="Roboto Mono Medium" panose="00000009000000000000" pitchFamily="49" charset="0"/>
+      <p:regular r:id="rId17"/>
+      <p:bold r:id="rId18"/>
+      <p:italic r:id="rId19"/>
+      <p:boldItalic r:id="rId20"/>
     </p:embeddedFont>
   </p:embeddedFontLst>
   <p:defaultTextStyle>
@@ -1250,7 +1251,7 @@
   <p:cSld>
     <p:spTree>
       <p:nvGrpSpPr>
-        <p:cNvPr id="1" name="Shape 960"/>
+        <p:cNvPr id="1" name="Shape 1118"/>
         <p:cNvGrpSpPr/>
         <p:nvPr/>
       </p:nvGrpSpPr>
@@ -1264,7 +1265,7 @@
       </p:grpSpPr>
       <p:sp>
         <p:nvSpPr>
-          <p:cNvPr id="961" name="Google Shape;961;g1209571f4d9_0_777:notes"/>
+          <p:cNvPr id="1119" name="Google Shape;1119;g1209571f4d9_0_633:notes"/>
           <p:cNvSpPr>
             <a:spLocks noGrp="1" noRot="1" noChangeAspect="1"/>
           </p:cNvSpPr>
@@ -1305,7 +1306,7 @@
       </p:sp>
       <p:sp>
         <p:nvSpPr>
-          <p:cNvPr id="962" name="Google Shape;962;g1209571f4d9_0_777:notes"/>
+          <p:cNvPr id="1120" name="Google Shape;1120;g1209571f4d9_0_633:notes"/>
           <p:cNvSpPr txBox="1">
             <a:spLocks noGrp="1"/>
           </p:cNvSpPr>
@@ -1344,7 +1345,116 @@
     </p:spTree>
     <p:extLst>
       <p:ext uri="{BB962C8B-B14F-4D97-AF65-F5344CB8AC3E}">
-        <p14:creationId xmlns:p14="http://schemas.microsoft.com/office/powerpoint/2010/main" val="1060014694"/>
+        <p14:creationId xmlns:p14="http://schemas.microsoft.com/office/powerpoint/2010/main" val="1538647049"/>
+      </p:ext>
+    </p:extLst>
+  </p:cSld>
+  <p:clrMapOvr>
+    <a:masterClrMapping/>
+  </p:clrMapOvr>
+</p:notes>
+</file>
+
+<file path=ppt/notesSlides/notesSlide7.xml><?xml version="1.0" encoding="utf-8"?>
+<p:notes xmlns:a="http://schemas.openxmlformats.org/drawingml/2006/main" xmlns:r="http://schemas.openxmlformats.org/officeDocument/2006/relationships" xmlns:p="http://schemas.openxmlformats.org/presentationml/2006/main" showMasterSp="0" showMasterPhAnim="0">
+  <p:cSld>
+    <p:spTree>
+      <p:nvGrpSpPr>
+        <p:cNvPr id="1" name="Shape 1118"/>
+        <p:cNvGrpSpPr/>
+        <p:nvPr/>
+      </p:nvGrpSpPr>
+      <p:grpSpPr>
+        <a:xfrm>
+          <a:off x="0" y="0"/>
+          <a:ext cx="0" cy="0"/>
+          <a:chOff x="0" y="0"/>
+          <a:chExt cx="0" cy="0"/>
+        </a:xfrm>
+      </p:grpSpPr>
+      <p:sp>
+        <p:nvSpPr>
+          <p:cNvPr id="1119" name="Google Shape;1119;g1209571f4d9_0_633:notes"/>
+          <p:cNvSpPr>
+            <a:spLocks noGrp="1" noRot="1" noChangeAspect="1"/>
+          </p:cNvSpPr>
+          <p:nvPr>
+            <p:ph type="sldImg" idx="2"/>
+          </p:nvPr>
+        </p:nvSpPr>
+        <p:spPr>
+          <a:xfrm>
+            <a:off x="381000" y="685800"/>
+            <a:ext cx="6096000" cy="3429000"/>
+          </a:xfrm>
+          <a:custGeom>
+            <a:avLst/>
+            <a:gdLst/>
+            <a:ahLst/>
+            <a:cxnLst/>
+            <a:rect l="l" t="t" r="r" b="b"/>
+            <a:pathLst>
+              <a:path w="120000" h="120000" extrusionOk="0">
+                <a:moveTo>
+                  <a:pt x="0" y="0"/>
+                </a:moveTo>
+                <a:lnTo>
+                  <a:pt x="120000" y="0"/>
+                </a:lnTo>
+                <a:lnTo>
+                  <a:pt x="120000" y="120000"/>
+                </a:lnTo>
+                <a:lnTo>
+                  <a:pt x="0" y="120000"/>
+                </a:lnTo>
+                <a:close/>
+              </a:path>
+            </a:pathLst>
+          </a:custGeom>
+        </p:spPr>
+      </p:sp>
+      <p:sp>
+        <p:nvSpPr>
+          <p:cNvPr id="1120" name="Google Shape;1120;g1209571f4d9_0_633:notes"/>
+          <p:cNvSpPr txBox="1">
+            <a:spLocks noGrp="1"/>
+          </p:cNvSpPr>
+          <p:nvPr>
+            <p:ph type="body" idx="1"/>
+          </p:nvPr>
+        </p:nvSpPr>
+        <p:spPr>
+          <a:xfrm>
+            <a:off x="685800" y="4343400"/>
+            <a:ext cx="5486400" cy="4114800"/>
+          </a:xfrm>
+          <a:prstGeom prst="rect">
+            <a:avLst/>
+          </a:prstGeom>
+        </p:spPr>
+        <p:txBody>
+          <a:bodyPr spcFirstLastPara="1" wrap="square" lIns="91425" tIns="91425" rIns="91425" bIns="91425" anchor="t" anchorCtr="0">
+            <a:noAutofit/>
+          </a:bodyPr>
+          <a:lstStyle/>
+          <a:p>
+            <a:pPr marL="0" lvl="0" indent="0" algn="l" rtl="0">
+              <a:spcBef>
+                <a:spcPts val="0"/>
+              </a:spcBef>
+              <a:spcAft>
+                <a:spcPts val="0"/>
+              </a:spcAft>
+              <a:buNone/>
+            </a:pPr>
+            <a:endParaRPr/>
+          </a:p>
+        </p:txBody>
+      </p:sp>
+    </p:spTree>
+    <p:extLst>
+      <p:ext uri="{BB962C8B-B14F-4D97-AF65-F5344CB8AC3E}">
+        <p14:creationId xmlns:p14="http://schemas.microsoft.com/office/powerpoint/2010/main" val="3844035473"/>
       </p:ext>
     </p:extLst>
   </p:cSld>
@@ -4263,7 +4373,7 @@
         <p:push/>
       </p:transition>
     </mc:Choice>
-    <mc:Fallback xmlns="" xmlns:mv="urn:schemas-microsoft-com:mac:vml" xmlns:c="http://schemas.openxmlformats.org/drawingml/2006/chart" xmlns:dgm="http://schemas.openxmlformats.org/drawingml/2006/diagram" xmlns:o="urn:schemas-microsoft-com:office:office" xmlns:v="urn:schemas-microsoft-com:vml" xmlns:pvml="urn:schemas-microsoft-com:office:powerpoint" xmlns:com="http://schemas.openxmlformats.org/drawingml/2006/compatibility" xmlns:p15="http://schemas.microsoft.com/office/powerpoint/2012/main" xmlns:ahyp="http://schemas.microsoft.com/office/drawing/2018/hyperlinkcolor">
+    <mc:Fallback xmlns:ahyp="http://schemas.microsoft.com/office/drawing/2018/hyperlinkcolor" xmlns:p15="http://schemas.microsoft.com/office/powerpoint/2012/main" xmlns:com="http://schemas.openxmlformats.org/drawingml/2006/compatibility" xmlns:pvml="urn:schemas-microsoft-com:office:powerpoint" xmlns:v="urn:schemas-microsoft-com:vml" xmlns:o="urn:schemas-microsoft-com:office:office" xmlns:dgm="http://schemas.openxmlformats.org/drawingml/2006/diagram" xmlns:c="http://schemas.openxmlformats.org/drawingml/2006/chart" xmlns:mv="urn:schemas-microsoft-com:mac:vml" xmlns="">
       <p:transition spd="slow">
         <p:fade/>
       </p:transition>
@@ -7581,8 +7691,8 @@
         </p:nvSpPr>
         <p:spPr>
           <a:xfrm>
-            <a:off x="2937741" y="3307350"/>
-            <a:ext cx="3268500" cy="792600"/>
+            <a:off x="2937740" y="3200853"/>
+            <a:ext cx="3268500" cy="1072818"/>
           </a:xfrm>
           <a:prstGeom prst="rect">
             <a:avLst/>
@@ -7613,7 +7723,7 @@
             </a:pPr>
             <a:r>
               <a:rPr lang="hu-HU" dirty="0"/>
-              <a:t>Ssss</a:t>
+              <a:t>Menü oldal</a:t>
             </a:r>
           </a:p>
           <a:p>
@@ -7636,7 +7746,7 @@
             </a:pPr>
             <a:r>
               <a:rPr lang="hu-HU" dirty="0"/>
-              <a:t>Ssss</a:t>
+              <a:t>Hamburger menü</a:t>
             </a:r>
           </a:p>
           <a:p>
@@ -7659,7 +7769,30 @@
             </a:pPr>
             <a:r>
               <a:rPr lang="hu-HU" dirty="0"/>
-              <a:t>Ssss</a:t>
+              <a:t>Következményei aloldal</a:t>
+            </a:r>
+          </a:p>
+          <a:p>
+            <a:pPr marL="285750" lvl="0" indent="-285750" algn="ctr" rtl="0">
+              <a:lnSpc>
+                <a:spcPct val="100000"/>
+              </a:lnSpc>
+              <a:spcBef>
+                <a:spcPts val="0"/>
+              </a:spcBef>
+              <a:spcAft>
+                <a:spcPts val="0"/>
+              </a:spcAft>
+              <a:buClr>
+                <a:schemeClr val="dk1"/>
+              </a:buClr>
+              <a:buSzPts val="1100"/>
+              <a:buFontTx/>
+              <a:buChar char="-"/>
+            </a:pPr>
+            <a:r>
+              <a:rPr lang="hu-HU" dirty="0"/>
+              <a:t>Források aloldal</a:t>
             </a:r>
           </a:p>
         </p:txBody>
@@ -7889,61 +8022,6 @@
           <a:chExt cx="0" cy="0"/>
         </a:xfrm>
       </p:grpSpPr>
-      <p:pic>
-        <p:nvPicPr>
-          <p:cNvPr id="1122" name="Google Shape;1122;p91"/>
-          <p:cNvPicPr preferRelativeResize="0"/>
-          <p:nvPr/>
-        </p:nvPicPr>
-        <p:blipFill rotWithShape="1">
-          <a:blip r:embed="rId3">
-            <a:alphaModFix/>
-          </a:blip>
-          <a:srcRect l="20235" r="20473"/>
-          <a:stretch/>
-        </p:blipFill>
-        <p:spPr>
-          <a:xfrm>
-            <a:off x="0" y="0"/>
-            <a:ext cx="4568648" cy="5143502"/>
-          </a:xfrm>
-          <a:prstGeom prst="rect">
-            <a:avLst/>
-          </a:prstGeom>
-          <a:noFill/>
-          <a:ln>
-            <a:noFill/>
-          </a:ln>
-        </p:spPr>
-      </p:pic>
-      <p:pic>
-        <p:nvPicPr>
-          <p:cNvPr id="1123" name="Google Shape;1123;p91"/>
-          <p:cNvPicPr preferRelativeResize="0"/>
-          <p:nvPr/>
-        </p:nvPicPr>
-        <p:blipFill>
-          <a:blip r:embed="rId4">
-            <a:alphaModFix/>
-          </a:blip>
-          <a:stretch>
-            <a:fillRect/>
-          </a:stretch>
-        </p:blipFill>
-        <p:spPr>
-          <a:xfrm rot="-321053">
-            <a:off x="4876224" y="2601345"/>
-            <a:ext cx="2869352" cy="2048126"/>
-          </a:xfrm>
-          <a:prstGeom prst="rect">
-            <a:avLst/>
-          </a:prstGeom>
-          <a:noFill/>
-          <a:ln>
-            <a:noFill/>
-          </a:ln>
-        </p:spPr>
-      </p:pic>
       <p:sp>
         <p:nvSpPr>
           <p:cNvPr id="1124" name="Google Shape;1124;p91"/>
@@ -7993,7 +8071,7 @@
           <p:nvPr/>
         </p:nvPicPr>
         <p:blipFill>
-          <a:blip r:embed="rId5">
+          <a:blip r:embed="rId3">
             <a:alphaModFix amt="56000"/>
           </a:blip>
           <a:stretch>
@@ -8014,377 +8092,88 @@
           </a:ln>
         </p:spPr>
       </p:pic>
-      <p:sp>
-        <p:nvSpPr>
-          <p:cNvPr id="1126" name="Google Shape;1126;p91"/>
-          <p:cNvSpPr txBox="1">
-            <a:spLocks noGrp="1"/>
-          </p:cNvSpPr>
-          <p:nvPr>
-            <p:ph type="subTitle" idx="1"/>
-          </p:nvPr>
-        </p:nvSpPr>
+      <p:pic>
+        <p:nvPicPr>
+          <p:cNvPr id="3" name="Kép 2">
+            <a:extLst>
+              <a:ext uri="{FF2B5EF4-FFF2-40B4-BE49-F238E27FC236}">
+                <a16:creationId xmlns:a16="http://schemas.microsoft.com/office/drawing/2014/main" id="{2B73DB57-5F1C-E330-2612-E0A7C5300290}"/>
+              </a:ext>
+            </a:extLst>
+          </p:cNvPr>
+          <p:cNvPicPr>
+            <a:picLocks noChangeAspect="1"/>
+          </p:cNvPicPr>
+          <p:nvPr/>
+        </p:nvPicPr>
+        <p:blipFill>
+          <a:blip r:embed="rId4"/>
+          <a:stretch>
+            <a:fillRect/>
+          </a:stretch>
+        </p:blipFill>
         <p:spPr>
-          <a:xfrm rot="-321082">
-            <a:off x="5129970" y="3250327"/>
-            <a:ext cx="2280640" cy="924717"/>
+          <a:xfrm>
+            <a:off x="4780732" y="2035375"/>
+            <a:ext cx="3697757" cy="2108575"/>
           </a:xfrm>
           <a:prstGeom prst="rect">
             <a:avLst/>
           </a:prstGeom>
         </p:spPr>
-        <p:txBody>
-          <a:bodyPr spcFirstLastPara="1" wrap="square" lIns="91425" tIns="91425" rIns="91425" bIns="91425" anchor="ctr" anchorCtr="0">
-            <a:noAutofit/>
-          </a:bodyPr>
-          <a:lstStyle/>
-          <a:p>
-            <a:pPr marL="0" lvl="0" indent="0" algn="l" rtl="0">
-              <a:spcBef>
-                <a:spcPts val="0"/>
-              </a:spcBef>
-              <a:spcAft>
-                <a:spcPts val="0"/>
-              </a:spcAft>
-              <a:buNone/>
-            </a:pPr>
-            <a:r>
-              <a:rPr lang="en">
+      </p:pic>
+      <p:pic>
+        <p:nvPicPr>
+          <p:cNvPr id="2050" name="Picture 2" descr="Stream Funny Face by Young Producers Group | Listen online for free on  SoundCloud">
+            <a:extLst>
+              <a:ext uri="{FF2B5EF4-FFF2-40B4-BE49-F238E27FC236}">
+                <a16:creationId xmlns:a16="http://schemas.microsoft.com/office/drawing/2014/main" id="{5C947DC4-820C-6B76-AD40-7820079FD21F}"/>
+              </a:ext>
+            </a:extLst>
+          </p:cNvPr>
+          <p:cNvPicPr>
+            <a:picLocks noChangeAspect="1" noChangeArrowheads="1"/>
+          </p:cNvPicPr>
+          <p:nvPr/>
+        </p:nvPicPr>
+        <p:blipFill>
+          <a:blip r:embed="rId5">
+            <a:extLst>
+              <a:ext uri="{28A0092B-C50C-407E-A947-70E740481C1C}">
+                <a14:useLocalDpi xmlns:a14="http://schemas.microsoft.com/office/drawing/2010/main" val="0"/>
+              </a:ext>
+            </a:extLst>
+          </a:blip>
+          <a:srcRect/>
+          <a:stretch>
+            <a:fillRect/>
+          </a:stretch>
+        </p:blipFill>
+        <p:spPr bwMode="auto">
+          <a:xfrm>
+            <a:off x="21467" y="465173"/>
+            <a:ext cx="4341802" cy="4341802"/>
+          </a:xfrm>
+          <a:prstGeom prst="rect">
+            <a:avLst/>
+          </a:prstGeom>
+          <a:noFill/>
+          <a:extLst>
+            <a:ext uri="{909E8E84-426E-40DD-AFC4-6F175D3DCCD1}">
+              <a14:hiddenFill xmlns:a14="http://schemas.microsoft.com/office/drawing/2010/main">
                 <a:solidFill>
-                  <a:srgbClr val="F8FAFB"/>
+                  <a:srgbClr val="FFFFFF"/>
                 </a:solidFill>
-              </a:rPr>
-              <a:t>Despite being red, Mars is a cold place. It’s full of iron oxide dust</a:t>
-            </a:r>
-            <a:endParaRPr>
-              <a:solidFill>
-                <a:srgbClr val="F8FAFB"/>
-              </a:solidFill>
-            </a:endParaRPr>
-          </a:p>
-        </p:txBody>
-      </p:sp>
-      <p:sp>
-        <p:nvSpPr>
-          <p:cNvPr id="1128" name="Google Shape;1128;p91"/>
-          <p:cNvSpPr/>
-          <p:nvPr/>
-        </p:nvSpPr>
-        <p:spPr>
-          <a:xfrm rot="1079510">
-            <a:off x="5700842" y="2400417"/>
-            <a:ext cx="1022213" cy="602417"/>
-          </a:xfrm>
-          <a:custGeom>
-            <a:avLst/>
-            <a:gdLst/>
-            <a:ahLst/>
-            <a:cxnLst/>
-            <a:rect l="l" t="t" r="r" b="b"/>
-            <a:pathLst>
-              <a:path w="44052" h="25961" extrusionOk="0">
-                <a:moveTo>
-                  <a:pt x="40035" y="0"/>
-                </a:moveTo>
-                <a:lnTo>
-                  <a:pt x="0" y="15402"/>
-                </a:lnTo>
-                <a:cubicBezTo>
-                  <a:pt x="0" y="15402"/>
-                  <a:pt x="1513" y="15761"/>
-                  <a:pt x="1873" y="16638"/>
-                </a:cubicBezTo>
-                <a:cubicBezTo>
-                  <a:pt x="2237" y="17514"/>
-                  <a:pt x="1524" y="18526"/>
-                  <a:pt x="1524" y="18526"/>
-                </a:cubicBezTo>
-                <a:cubicBezTo>
-                  <a:pt x="1524" y="18526"/>
-                  <a:pt x="2999" y="18885"/>
-                  <a:pt x="3380" y="19816"/>
-                </a:cubicBezTo>
-                <a:cubicBezTo>
-                  <a:pt x="3767" y="20752"/>
-                  <a:pt x="2885" y="22439"/>
-                  <a:pt x="2885" y="22439"/>
-                </a:cubicBezTo>
-                <a:cubicBezTo>
-                  <a:pt x="2885" y="22439"/>
-                  <a:pt x="4447" y="23011"/>
-                  <a:pt x="4703" y="23631"/>
-                </a:cubicBezTo>
-                <a:cubicBezTo>
-                  <a:pt x="4958" y="24252"/>
-                  <a:pt x="4327" y="25960"/>
-                  <a:pt x="4327" y="25960"/>
-                </a:cubicBezTo>
-                <a:lnTo>
-                  <a:pt x="44051" y="10684"/>
-                </a:lnTo>
-                <a:cubicBezTo>
-                  <a:pt x="41510" y="9791"/>
-                  <a:pt x="42609" y="7168"/>
-                  <a:pt x="42609" y="7168"/>
-                </a:cubicBezTo>
-                <a:cubicBezTo>
-                  <a:pt x="42609" y="7168"/>
-                  <a:pt x="41521" y="6466"/>
-                  <a:pt x="41047" y="5753"/>
-                </a:cubicBezTo>
-                <a:cubicBezTo>
-                  <a:pt x="40574" y="5040"/>
-                  <a:pt x="41434" y="3418"/>
-                  <a:pt x="41434" y="3418"/>
-                </a:cubicBezTo>
-                <a:cubicBezTo>
-                  <a:pt x="41434" y="3418"/>
-                  <a:pt x="39806" y="2993"/>
-                  <a:pt x="39491" y="2221"/>
-                </a:cubicBezTo>
-                <a:cubicBezTo>
-                  <a:pt x="39175" y="1442"/>
-                  <a:pt x="40035" y="0"/>
-                  <a:pt x="40035" y="0"/>
-                </a:cubicBezTo>
-                <a:close/>
-              </a:path>
-            </a:pathLst>
-          </a:custGeom>
-          <a:solidFill>
-            <a:schemeClr val="dk1">
-              <a:alpha val="26789"/>
-            </a:schemeClr>
-          </a:solidFill>
-          <a:ln>
-            <a:noFill/>
-          </a:ln>
+              </a14:hiddenFill>
+            </a:ext>
+          </a:extLst>
         </p:spPr>
-        <p:txBody>
-          <a:bodyPr spcFirstLastPara="1" wrap="square" lIns="91425" tIns="91425" rIns="91425" bIns="91425" anchor="ctr" anchorCtr="0">
-            <a:noAutofit/>
-          </a:bodyPr>
-          <a:lstStyle/>
-          <a:p>
-            <a:pPr marL="0" lvl="0" indent="0" algn="l" rtl="0">
-              <a:spcBef>
-                <a:spcPts val="0"/>
-              </a:spcBef>
-              <a:spcAft>
-                <a:spcPts val="0"/>
-              </a:spcAft>
-              <a:buNone/>
-            </a:pPr>
-            <a:endParaRPr/>
-          </a:p>
-        </p:txBody>
-      </p:sp>
+      </p:pic>
     </p:spTree>
   </p:cSld>
   <p:clrMapOvr>
     <a:masterClrMapping/>
   </p:clrMapOvr>
-  <p:timing>
-    <p:tnLst>
-      <p:par>
-        <p:cTn id="1" dur="indefinite" restart="never" nodeType="tmRoot">
-          <p:childTnLst>
-            <p:seq concurrent="1" nextAc="seek">
-              <p:cTn id="2" dur="indefinite" nodeType="mainSeq">
-                <p:childTnLst>
-                  <p:par>
-                    <p:cTn id="3" fill="hold">
-                      <p:stCondLst>
-                        <p:cond delay="indefinite"/>
-                        <p:cond evt="onBegin" delay="0">
-                          <p:tn val="2"/>
-                        </p:cond>
-                      </p:stCondLst>
-                      <p:childTnLst>
-                        <p:par>
-                          <p:cTn id="4" fill="hold">
-                            <p:stCondLst>
-                              <p:cond delay="0"/>
-                            </p:stCondLst>
-                            <p:childTnLst>
-                              <p:par>
-                                <p:cTn id="5" presetID="2" presetClass="entr" presetSubtype="4" fill="hold" nodeType="afterEffect">
-                                  <p:stCondLst>
-                                    <p:cond delay="0"/>
-                                  </p:stCondLst>
-                                  <p:childTnLst>
-                                    <p:set>
-                                      <p:cBhvr>
-                                        <p:cTn id="6" dur="1" fill="hold">
-                                          <p:stCondLst>
-                                            <p:cond delay="0"/>
-                                          </p:stCondLst>
-                                        </p:cTn>
-                                        <p:tgtEl>
-                                          <p:spTgt spid="1126"/>
-                                        </p:tgtEl>
-                                        <p:attrNameLst>
-                                          <p:attrName>style.visibility</p:attrName>
-                                        </p:attrNameLst>
-                                      </p:cBhvr>
-                                      <p:to>
-                                        <p:strVal val="visible"/>
-                                      </p:to>
-                                    </p:set>
-                                    <p:anim calcmode="lin" valueType="num">
-                                      <p:cBhvr additive="base">
-                                        <p:cTn id="7" dur="1000"/>
-                                        <p:tgtEl>
-                                          <p:spTgt spid="1126"/>
-                                        </p:tgtEl>
-                                        <p:attrNameLst>
-                                          <p:attrName>ppt_y</p:attrName>
-                                        </p:attrNameLst>
-                                      </p:cBhvr>
-                                      <p:tavLst>
-                                        <p:tav tm="0">
-                                          <p:val>
-                                            <p:strVal val="#ppt_y+1"/>
-                                          </p:val>
-                                        </p:tav>
-                                        <p:tav tm="100000">
-                                          <p:val>
-                                            <p:strVal val="#ppt_y"/>
-                                          </p:val>
-                                        </p:tav>
-                                      </p:tavLst>
-                                    </p:anim>
-                                  </p:childTnLst>
-                                </p:cTn>
-                              </p:par>
-                              <p:par>
-                                <p:cTn id="8" presetID="2" presetClass="entr" presetSubtype="4" fill="hold" nodeType="withEffect">
-                                  <p:stCondLst>
-                                    <p:cond delay="0"/>
-                                  </p:stCondLst>
-                                  <p:childTnLst>
-                                    <p:set>
-                                      <p:cBhvr>
-                                        <p:cTn id="9" dur="1" fill="hold">
-                                          <p:stCondLst>
-                                            <p:cond delay="0"/>
-                                          </p:stCondLst>
-                                        </p:cTn>
-                                        <p:tgtEl>
-                                          <p:spTgt spid="1128"/>
-                                        </p:tgtEl>
-                                        <p:attrNameLst>
-                                          <p:attrName>style.visibility</p:attrName>
-                                        </p:attrNameLst>
-                                      </p:cBhvr>
-                                      <p:to>
-                                        <p:strVal val="visible"/>
-                                      </p:to>
-                                    </p:set>
-                                    <p:anim calcmode="lin" valueType="num">
-                                      <p:cBhvr additive="base">
-                                        <p:cTn id="10" dur="1000"/>
-                                        <p:tgtEl>
-                                          <p:spTgt spid="1128"/>
-                                        </p:tgtEl>
-                                        <p:attrNameLst>
-                                          <p:attrName>ppt_y</p:attrName>
-                                        </p:attrNameLst>
-                                      </p:cBhvr>
-                                      <p:tavLst>
-                                        <p:tav tm="0">
-                                          <p:val>
-                                            <p:strVal val="#ppt_y+1"/>
-                                          </p:val>
-                                        </p:tav>
-                                        <p:tav tm="100000">
-                                          <p:val>
-                                            <p:strVal val="#ppt_y"/>
-                                          </p:val>
-                                        </p:tav>
-                                      </p:tavLst>
-                                    </p:anim>
-                                  </p:childTnLst>
-                                </p:cTn>
-                              </p:par>
-                              <p:par>
-                                <p:cTn id="11" presetID="2" presetClass="entr" presetSubtype="4" fill="hold" nodeType="withEffect">
-                                  <p:stCondLst>
-                                    <p:cond delay="0"/>
-                                  </p:stCondLst>
-                                  <p:childTnLst>
-                                    <p:set>
-                                      <p:cBhvr>
-                                        <p:cTn id="12" dur="1" fill="hold">
-                                          <p:stCondLst>
-                                            <p:cond delay="0"/>
-                                          </p:stCondLst>
-                                        </p:cTn>
-                                        <p:tgtEl>
-                                          <p:spTgt spid="1123"/>
-                                        </p:tgtEl>
-                                        <p:attrNameLst>
-                                          <p:attrName>style.visibility</p:attrName>
-                                        </p:attrNameLst>
-                                      </p:cBhvr>
-                                      <p:to>
-                                        <p:strVal val="visible"/>
-                                      </p:to>
-                                    </p:set>
-                                    <p:anim calcmode="lin" valueType="num">
-                                      <p:cBhvr additive="base">
-                                        <p:cTn id="13" dur="1000"/>
-                                        <p:tgtEl>
-                                          <p:spTgt spid="1123"/>
-                                        </p:tgtEl>
-                                        <p:attrNameLst>
-                                          <p:attrName>ppt_y</p:attrName>
-                                        </p:attrNameLst>
-                                      </p:cBhvr>
-                                      <p:tavLst>
-                                        <p:tav tm="0">
-                                          <p:val>
-                                            <p:strVal val="#ppt_y+1"/>
-                                          </p:val>
-                                        </p:tav>
-                                        <p:tav tm="100000">
-                                          <p:val>
-                                            <p:strVal val="#ppt_y"/>
-                                          </p:val>
-                                        </p:tav>
-                                      </p:tavLst>
-                                    </p:anim>
-                                  </p:childTnLst>
-                                </p:cTn>
-                              </p:par>
-                            </p:childTnLst>
-                          </p:cTn>
-                        </p:par>
-                      </p:childTnLst>
-                    </p:cTn>
-                  </p:par>
-                </p:childTnLst>
-              </p:cTn>
-              <p:prevCondLst>
-                <p:cond evt="onPrev" delay="0">
-                  <p:tgtEl>
-                    <p:sldTgt/>
-                  </p:tgtEl>
-                </p:cond>
-              </p:prevCondLst>
-              <p:nextCondLst>
-                <p:cond evt="onNext" delay="0">
-                  <p:tgtEl>
-                    <p:sldTgt/>
-                  </p:tgtEl>
-                </p:cond>
-              </p:nextCondLst>
-            </p:seq>
-          </p:childTnLst>
-        </p:cTn>
-      </p:par>
-    </p:tnLst>
-  </p:timing>
 </p:sld>
 </file>
 
@@ -8393,7 +8182,7 @@
   <p:cSld>
     <p:spTree>
       <p:nvGrpSpPr>
-        <p:cNvPr id="1" name="Shape 963"/>
+        <p:cNvPr id="1" name="Shape 1121"/>
         <p:cNvGrpSpPr/>
         <p:nvPr/>
       </p:nvGrpSpPr>
@@ -8407,7 +8196,7 @@
       </p:grpSpPr>
       <p:sp>
         <p:nvSpPr>
-          <p:cNvPr id="964" name="Google Shape;964;p83"/>
+          <p:cNvPr id="1124" name="Google Shape;1124;p91"/>
           <p:cNvSpPr txBox="1">
             <a:spLocks noGrp="1"/>
           </p:cNvSpPr>
@@ -8417,8 +8206,8 @@
         </p:nvSpPr>
         <p:spPr>
           <a:xfrm>
-            <a:off x="1781550" y="711175"/>
-            <a:ext cx="5933700" cy="609900"/>
+            <a:off x="4996075" y="999550"/>
+            <a:ext cx="2225992" cy="534082"/>
           </a:xfrm>
           <a:prstGeom prst="rect">
             <a:avLst/>
@@ -8430,7 +8219,7 @@
           </a:bodyPr>
           <a:lstStyle/>
           <a:p>
-            <a:pPr marL="0" lvl="0" indent="0" algn="ctr" rtl="0">
+            <a:pPr marL="0" lvl="0" indent="0" algn="l" rtl="0">
               <a:spcBef>
                 <a:spcPts val="0"/>
               </a:spcBef>
@@ -8441,1509 +8230,338 @@
             </a:pPr>
             <a:r>
               <a:rPr lang="hu-HU" dirty="0"/>
-              <a:t>Oldalak és témák</a:t>
+              <a:t>Kódrészletek:</a:t>
             </a:r>
             <a:endParaRPr dirty="0"/>
           </a:p>
         </p:txBody>
       </p:sp>
-      <p:graphicFrame>
-        <p:nvGraphicFramePr>
-          <p:cNvPr id="965" name="Google Shape;965;p83"/>
-          <p:cNvGraphicFramePr/>
+      <p:pic>
+        <p:nvPicPr>
+          <p:cNvPr id="1125" name="Google Shape;1125;p91"/>
+          <p:cNvPicPr preferRelativeResize="0"/>
           <p:nvPr/>
-        </p:nvGraphicFramePr>
-        <p:xfrm>
-          <a:off x="1428750" y="1321075"/>
-          <a:ext cx="7173981" cy="2811678"/>
-        </p:xfrm>
-        <a:graphic>
-          <a:graphicData uri="http://schemas.openxmlformats.org/drawingml/2006/table">
-            <a:tbl>
-              <a:tblPr>
-                <a:noFill/>
-                <a:tableStyleId>{9EDF64B5-CB48-4BC7-B40F-9581964FA39B}</a:tableStyleId>
-              </a:tblPr>
-              <a:tblGrid>
-                <a:gridCol w="1053193">
-                  <a:extLst>
-                    <a:ext uri="{9D8B030D-6E8A-4147-A177-3AD203B41FA5}">
-                      <a16:colId xmlns:a16="http://schemas.microsoft.com/office/drawing/2014/main" val="20000"/>
-                    </a:ext>
-                  </a:extLst>
-                </a:gridCol>
-                <a:gridCol w="1576610">
-                  <a:extLst>
-                    <a:ext uri="{9D8B030D-6E8A-4147-A177-3AD203B41FA5}">
-                      <a16:colId xmlns:a16="http://schemas.microsoft.com/office/drawing/2014/main" val="20001"/>
-                    </a:ext>
-                  </a:extLst>
-                </a:gridCol>
-                <a:gridCol w="1140823">
-                  <a:extLst>
-                    <a:ext uri="{9D8B030D-6E8A-4147-A177-3AD203B41FA5}">
-                      <a16:colId xmlns:a16="http://schemas.microsoft.com/office/drawing/2014/main" val="20002"/>
-                    </a:ext>
-                  </a:extLst>
-                </a:gridCol>
-                <a:gridCol w="1698171">
-                  <a:extLst>
-                    <a:ext uri="{9D8B030D-6E8A-4147-A177-3AD203B41FA5}">
-                      <a16:colId xmlns:a16="http://schemas.microsoft.com/office/drawing/2014/main" val="20003"/>
-                    </a:ext>
-                  </a:extLst>
-                </a:gridCol>
-                <a:gridCol w="1705184">
-                  <a:extLst>
-                    <a:ext uri="{9D8B030D-6E8A-4147-A177-3AD203B41FA5}">
-                      <a16:colId xmlns:a16="http://schemas.microsoft.com/office/drawing/2014/main" val="20004"/>
-                    </a:ext>
-                  </a:extLst>
-                </a:gridCol>
-              </a:tblGrid>
-              <a:tr h="556238">
-                <a:tc>
-                  <a:txBody>
-                    <a:bodyPr/>
-                    <a:lstStyle/>
-                    <a:p>
-                      <a:r>
-                        <a:rPr lang="hu-HU" dirty="0">
-                          <a:solidFill>
-                            <a:schemeClr val="accent6"/>
-                          </a:solidFill>
-                          <a:latin typeface="Roboto Mono"/>
-                          <a:ea typeface="Roboto Mono"/>
-                          <a:cs typeface="Roboto Mono"/>
-                          <a:sym typeface="Roboto Mono"/>
-                        </a:rPr>
-                        <a:t>Oldalak:</a:t>
-                      </a:r>
-                      <a:endParaRPr lang="hu-HU" dirty="0"/>
-                    </a:p>
-                  </a:txBody>
-                  <a:tcPr marL="91425" marR="91425" marT="91425" marB="91425" anchor="ctr">
-                    <a:lnL w="19050" cap="flat" cmpd="sng">
-                      <a:solidFill>
-                        <a:schemeClr val="dk1"/>
-                      </a:solidFill>
-                      <a:prstDash val="solid"/>
-                      <a:round/>
-                      <a:headEnd type="none" w="sm" len="sm"/>
-                      <a:tailEnd type="none" w="sm" len="sm"/>
-                    </a:lnL>
-                    <a:lnR w="19050" cap="flat" cmpd="sng" algn="ctr">
-                      <a:solidFill>
-                        <a:schemeClr val="dk1"/>
-                      </a:solidFill>
-                      <a:prstDash val="solid"/>
-                      <a:round/>
-                      <a:headEnd type="none" w="sm" len="sm"/>
-                      <a:tailEnd type="none" w="sm" len="sm"/>
-                    </a:lnR>
-                    <a:lnT w="19050" cap="flat" cmpd="sng" algn="ctr">
-                      <a:solidFill>
-                        <a:schemeClr val="dk1"/>
-                      </a:solidFill>
-                      <a:prstDash val="solid"/>
-                      <a:round/>
-                      <a:headEnd type="none" w="sm" len="sm"/>
-                      <a:tailEnd type="none" w="sm" len="sm"/>
-                    </a:lnT>
-                    <a:lnB w="19050" cap="flat" cmpd="sng" algn="ctr">
-                      <a:solidFill>
-                        <a:schemeClr val="dk1"/>
-                      </a:solidFill>
-                      <a:prstDash val="solid"/>
-                      <a:round/>
-                      <a:headEnd type="none" w="sm" len="sm"/>
-                      <a:tailEnd type="none" w="sm" len="sm"/>
-                    </a:lnB>
-                  </a:tcPr>
-                </a:tc>
-                <a:tc gridSpan="4">
-                  <a:txBody>
-                    <a:bodyPr/>
-                    <a:lstStyle/>
-                    <a:p>
-                      <a:pPr marL="0" lvl="0" indent="0" algn="ctr" rtl="0">
-                        <a:spcBef>
-                          <a:spcPts val="0"/>
-                        </a:spcBef>
-                        <a:spcAft>
-                          <a:spcPts val="0"/>
-                        </a:spcAft>
-                        <a:buNone/>
-                      </a:pPr>
-                      <a:r>
-                        <a:rPr lang="hu-HU" sz="2100" b="1" dirty="0">
-                          <a:solidFill>
-                            <a:srgbClr val="FFFFFF"/>
-                          </a:solidFill>
-                          <a:latin typeface="Concert One"/>
-                          <a:ea typeface="Concert One"/>
-                          <a:cs typeface="Concert One"/>
-                          <a:sym typeface="Concert One"/>
-                        </a:rPr>
-                        <a:t>Témák:</a:t>
-                      </a:r>
-                    </a:p>
-                  </a:txBody>
-                  <a:tcPr marL="91425" marR="91425" marT="91425" marB="91425">
-                    <a:lnL w="19050" cap="flat" cmpd="sng" algn="ctr">
-                      <a:solidFill>
-                        <a:schemeClr val="dk1"/>
-                      </a:solidFill>
-                      <a:prstDash val="solid"/>
-                      <a:round/>
-                      <a:headEnd type="none" w="sm" len="sm"/>
-                      <a:tailEnd type="none" w="sm" len="sm"/>
-                    </a:lnL>
-                    <a:lnR w="19050" cap="flat" cmpd="sng" algn="ctr">
-                      <a:solidFill>
-                        <a:schemeClr val="dk1"/>
-                      </a:solidFill>
-                      <a:prstDash val="solid"/>
-                      <a:round/>
-                      <a:headEnd type="none" w="sm" len="sm"/>
-                      <a:tailEnd type="none" w="sm" len="sm"/>
-                    </a:lnR>
-                    <a:lnT w="19050" cap="flat" cmpd="sng" algn="ctr">
-                      <a:solidFill>
-                        <a:schemeClr val="dk1"/>
-                      </a:solidFill>
-                      <a:prstDash val="solid"/>
-                      <a:round/>
-                      <a:headEnd type="none" w="sm" len="sm"/>
-                      <a:tailEnd type="none" w="sm" len="sm"/>
-                    </a:lnT>
-                    <a:lnB w="19050" cap="flat" cmpd="sng" algn="ctr">
-                      <a:solidFill>
-                        <a:schemeClr val="dk1"/>
-                      </a:solidFill>
-                      <a:prstDash val="solid"/>
-                      <a:round/>
-                      <a:headEnd type="none" w="sm" len="sm"/>
-                      <a:tailEnd type="none" w="sm" len="sm"/>
-                    </a:lnB>
-                    <a:solidFill>
-                      <a:schemeClr val="accent1"/>
-                    </a:solidFill>
-                  </a:tcPr>
-                </a:tc>
-                <a:tc hMerge="1">
-                  <a:txBody>
-                    <a:bodyPr/>
-                    <a:lstStyle/>
-                    <a:p>
-                      <a:endParaRPr lang="hu-HU"/>
-                    </a:p>
-                  </a:txBody>
-                  <a:tcPr/>
-                </a:tc>
-                <a:tc hMerge="1">
-                  <a:txBody>
-                    <a:bodyPr/>
-                    <a:lstStyle/>
-                    <a:p>
-                      <a:endParaRPr lang="hu-HU"/>
-                    </a:p>
-                  </a:txBody>
-                  <a:tcPr/>
-                </a:tc>
-                <a:tc hMerge="1">
-                  <a:txBody>
-                    <a:bodyPr/>
-                    <a:lstStyle/>
-                    <a:p>
-                      <a:endParaRPr lang="hu-HU"/>
-                    </a:p>
-                  </a:txBody>
-                  <a:tcPr/>
-                </a:tc>
-                <a:extLst>
-                  <a:ext uri="{0D108BD9-81ED-4DB2-BD59-A6C34878D82A}">
-                    <a16:rowId xmlns:a16="http://schemas.microsoft.com/office/drawing/2014/main" val="965060724"/>
-                  </a:ext>
-                </a:extLst>
-              </a:tr>
-              <a:tr h="609575">
-                <a:tc>
-                  <a:txBody>
-                    <a:bodyPr/>
-                    <a:lstStyle/>
-                    <a:p>
-                      <a:pPr marL="0" marR="0" lvl="0" indent="0" algn="ctr" defTabSz="914400" rtl="0" eaLnBrk="1" fontAlgn="auto" latinLnBrk="0" hangingPunct="1">
-                        <a:lnSpc>
-                          <a:spcPct val="100000"/>
-                        </a:lnSpc>
-                        <a:spcBef>
-                          <a:spcPts val="0"/>
-                        </a:spcBef>
-                        <a:spcAft>
-                          <a:spcPts val="0"/>
-                        </a:spcAft>
-                        <a:buClr>
-                          <a:srgbClr val="000000"/>
-                        </a:buClr>
-                        <a:buSzTx/>
-                        <a:buFont typeface="Arial"/>
-                        <a:buNone/>
-                        <a:tabLst/>
-                        <a:defRPr/>
-                      </a:pPr>
-                      <a:r>
-                        <a:rPr lang="hu-HU" dirty="0">
-                          <a:solidFill>
-                            <a:schemeClr val="accent6"/>
-                          </a:solidFill>
-                          <a:latin typeface="Roboto Mono"/>
-                          <a:ea typeface="Roboto Mono"/>
-                          <a:cs typeface="Roboto Mono"/>
-                          <a:sym typeface="Roboto Mono"/>
-                        </a:rPr>
-                        <a:t>Menü</a:t>
-                      </a:r>
-                    </a:p>
-                  </a:txBody>
-                  <a:tcPr marL="91425" marR="91425" marT="91425" marB="91425" anchor="ctr">
-                    <a:lnL w="19050" cap="flat" cmpd="sng">
-                      <a:solidFill>
-                        <a:schemeClr val="dk1"/>
-                      </a:solidFill>
-                      <a:prstDash val="solid"/>
-                      <a:round/>
-                      <a:headEnd type="none" w="sm" len="sm"/>
-                      <a:tailEnd type="none" w="sm" len="sm"/>
-                    </a:lnL>
-                    <a:lnR w="19050" cap="flat" cmpd="sng">
-                      <a:solidFill>
-                        <a:schemeClr val="dk1"/>
-                      </a:solidFill>
-                      <a:prstDash val="solid"/>
-                      <a:round/>
-                      <a:headEnd type="none" w="sm" len="sm"/>
-                      <a:tailEnd type="none" w="sm" len="sm"/>
-                    </a:lnR>
-                    <a:lnT w="19050" cap="flat" cmpd="sng">
-                      <a:solidFill>
-                        <a:schemeClr val="dk1"/>
-                      </a:solidFill>
-                      <a:prstDash val="solid"/>
-                      <a:round/>
-                      <a:headEnd type="none" w="sm" len="sm"/>
-                      <a:tailEnd type="none" w="sm" len="sm"/>
-                    </a:lnT>
-                    <a:lnB w="19050" cap="flat" cmpd="sng">
-                      <a:solidFill>
-                        <a:schemeClr val="dk1"/>
-                      </a:solidFill>
-                      <a:prstDash val="solid"/>
-                      <a:round/>
-                      <a:headEnd type="none" w="sm" len="sm"/>
-                      <a:tailEnd type="none" w="sm" len="sm"/>
-                    </a:lnB>
-                  </a:tcPr>
-                </a:tc>
-                <a:tc gridSpan="4">
-                  <a:txBody>
-                    <a:bodyPr/>
-                    <a:lstStyle/>
-                    <a:p>
-                      <a:pPr marL="0" lvl="0" indent="0" algn="ctr" rtl="0">
-                        <a:spcBef>
-                          <a:spcPts val="0"/>
-                        </a:spcBef>
-                        <a:spcAft>
-                          <a:spcPts val="0"/>
-                        </a:spcAft>
-                        <a:buNone/>
-                      </a:pPr>
-                      <a:r>
-                        <a:rPr lang="hu-HU" dirty="0">
-                          <a:solidFill>
-                            <a:schemeClr val="dk1"/>
-                          </a:solidFill>
-                          <a:latin typeface="Roboto Mono"/>
-                          <a:ea typeface="Roboto Mono"/>
-                          <a:cs typeface="Roboto Mono"/>
-                          <a:sym typeface="Roboto Mono"/>
-                        </a:rPr>
-                        <a:t>Link mindenhova</a:t>
-                      </a:r>
-                      <a:endParaRPr dirty="0">
-                        <a:solidFill>
-                          <a:schemeClr val="dk1"/>
-                        </a:solidFill>
-                        <a:latin typeface="Roboto Mono"/>
-                        <a:ea typeface="Roboto Mono"/>
-                        <a:cs typeface="Roboto Mono"/>
-                        <a:sym typeface="Roboto Mono"/>
-                      </a:endParaRPr>
-                    </a:p>
-                  </a:txBody>
-                  <a:tcPr marL="91425" marR="91425" marT="91425" marB="91425" anchor="ctr">
-                    <a:lnL w="19050" cap="flat" cmpd="sng">
-                      <a:solidFill>
-                        <a:schemeClr val="dk1"/>
-                      </a:solidFill>
-                      <a:prstDash val="solid"/>
-                      <a:round/>
-                      <a:headEnd type="none" w="sm" len="sm"/>
-                      <a:tailEnd type="none" w="sm" len="sm"/>
-                    </a:lnL>
-                    <a:lnR w="19050" cap="flat" cmpd="sng" algn="ctr">
-                      <a:solidFill>
-                        <a:schemeClr val="dk1"/>
-                      </a:solidFill>
-                      <a:prstDash val="solid"/>
-                      <a:round/>
-                      <a:headEnd type="none" w="sm" len="sm"/>
-                      <a:tailEnd type="none" w="sm" len="sm"/>
-                    </a:lnR>
-                    <a:lnT w="19050" cap="flat" cmpd="sng">
-                      <a:solidFill>
-                        <a:schemeClr val="dk1"/>
-                      </a:solidFill>
-                      <a:prstDash val="solid"/>
-                      <a:round/>
-                      <a:headEnd type="none" w="sm" len="sm"/>
-                      <a:tailEnd type="none" w="sm" len="sm"/>
-                    </a:lnT>
-                    <a:lnB w="19050" cap="flat" cmpd="sng" algn="ctr">
-                      <a:solidFill>
-                        <a:schemeClr val="dk1"/>
-                      </a:solidFill>
-                      <a:prstDash val="solid"/>
-                      <a:round/>
-                      <a:headEnd type="none" w="sm" len="sm"/>
-                      <a:tailEnd type="none" w="sm" len="sm"/>
-                    </a:lnB>
-                  </a:tcPr>
-                </a:tc>
-                <a:tc hMerge="1">
-                  <a:txBody>
-                    <a:bodyPr/>
-                    <a:lstStyle/>
-                    <a:p>
-                      <a:pPr marL="0" lvl="0" indent="0" algn="ctr" rtl="0">
-                        <a:spcBef>
-                          <a:spcPts val="0"/>
-                        </a:spcBef>
-                        <a:spcAft>
-                          <a:spcPts val="0"/>
-                        </a:spcAft>
-                        <a:buNone/>
-                      </a:pPr>
-                      <a:endParaRPr dirty="0">
-                        <a:solidFill>
-                          <a:schemeClr val="dk1"/>
-                        </a:solidFill>
-                        <a:latin typeface="Roboto Mono"/>
-                        <a:ea typeface="Roboto Mono"/>
-                        <a:cs typeface="Roboto Mono"/>
-                        <a:sym typeface="Roboto Mono"/>
-                      </a:endParaRPr>
-                    </a:p>
-                  </a:txBody>
-                  <a:tcPr marL="91425" marR="91425" marT="91425" marB="91425" anchor="ctr">
-                    <a:lnL w="19050" cap="flat" cmpd="sng">
-                      <a:solidFill>
-                        <a:schemeClr val="dk1"/>
-                      </a:solidFill>
-                      <a:prstDash val="solid"/>
-                      <a:round/>
-                      <a:headEnd type="none" w="sm" len="sm"/>
-                      <a:tailEnd type="none" w="sm" len="sm"/>
-                    </a:lnL>
-                    <a:lnR w="19050" cap="flat" cmpd="sng">
-                      <a:solidFill>
-                        <a:schemeClr val="dk1"/>
-                      </a:solidFill>
-                      <a:prstDash val="solid"/>
-                      <a:round/>
-                      <a:headEnd type="none" w="sm" len="sm"/>
-                      <a:tailEnd type="none" w="sm" len="sm"/>
-                    </a:lnR>
-                    <a:lnT w="19050" cap="flat" cmpd="sng">
-                      <a:solidFill>
-                        <a:schemeClr val="dk1"/>
-                      </a:solidFill>
-                      <a:prstDash val="solid"/>
-                      <a:round/>
-                      <a:headEnd type="none" w="sm" len="sm"/>
-                      <a:tailEnd type="none" w="sm" len="sm"/>
-                    </a:lnT>
-                    <a:lnB w="19050" cap="flat" cmpd="sng">
-                      <a:solidFill>
-                        <a:schemeClr val="dk1"/>
-                      </a:solidFill>
-                      <a:prstDash val="solid"/>
-                      <a:round/>
-                      <a:headEnd type="none" w="sm" len="sm"/>
-                      <a:tailEnd type="none" w="sm" len="sm"/>
-                    </a:lnB>
-                  </a:tcPr>
-                </a:tc>
-                <a:tc hMerge="1">
-                  <a:txBody>
-                    <a:bodyPr/>
-                    <a:lstStyle/>
-                    <a:p>
-                      <a:pPr marL="0" lvl="0" indent="0" algn="ctr" rtl="0">
-                        <a:spcBef>
-                          <a:spcPts val="0"/>
-                        </a:spcBef>
-                        <a:spcAft>
-                          <a:spcPts val="0"/>
-                        </a:spcAft>
-                        <a:buNone/>
-                      </a:pPr>
-                      <a:endParaRPr>
-                        <a:solidFill>
-                          <a:schemeClr val="dk1"/>
-                        </a:solidFill>
-                        <a:latin typeface="Roboto Mono"/>
-                        <a:ea typeface="Roboto Mono"/>
-                        <a:cs typeface="Roboto Mono"/>
-                        <a:sym typeface="Roboto Mono"/>
-                      </a:endParaRPr>
-                    </a:p>
-                  </a:txBody>
-                  <a:tcPr marL="91425" marR="91425" marT="91425" marB="91425" anchor="ctr">
-                    <a:lnL w="19050" cap="flat" cmpd="sng">
-                      <a:solidFill>
-                        <a:schemeClr val="dk1"/>
-                      </a:solidFill>
-                      <a:prstDash val="solid"/>
-                      <a:round/>
-                      <a:headEnd type="none" w="sm" len="sm"/>
-                      <a:tailEnd type="none" w="sm" len="sm"/>
-                    </a:lnL>
-                    <a:lnR w="19050" cap="flat" cmpd="sng">
-                      <a:solidFill>
-                        <a:schemeClr val="dk1"/>
-                      </a:solidFill>
-                      <a:prstDash val="solid"/>
-                      <a:round/>
-                      <a:headEnd type="none" w="sm" len="sm"/>
-                      <a:tailEnd type="none" w="sm" len="sm"/>
-                    </a:lnR>
-                    <a:lnT w="19050" cap="flat" cmpd="sng">
-                      <a:solidFill>
-                        <a:schemeClr val="dk1"/>
-                      </a:solidFill>
-                      <a:prstDash val="solid"/>
-                      <a:round/>
-                      <a:headEnd type="none" w="sm" len="sm"/>
-                      <a:tailEnd type="none" w="sm" len="sm"/>
-                    </a:lnT>
-                    <a:lnB w="19050" cap="flat" cmpd="sng">
-                      <a:solidFill>
-                        <a:schemeClr val="dk1"/>
-                      </a:solidFill>
-                      <a:prstDash val="solid"/>
-                      <a:round/>
-                      <a:headEnd type="none" w="sm" len="sm"/>
-                      <a:tailEnd type="none" w="sm" len="sm"/>
-                    </a:lnB>
-                  </a:tcPr>
-                </a:tc>
-                <a:tc hMerge="1">
-                  <a:txBody>
-                    <a:bodyPr/>
-                    <a:lstStyle/>
-                    <a:p>
-                      <a:pPr marL="0" lvl="0" indent="0" algn="ctr" rtl="0">
-                        <a:spcBef>
-                          <a:spcPts val="0"/>
-                        </a:spcBef>
-                        <a:spcAft>
-                          <a:spcPts val="0"/>
-                        </a:spcAft>
-                        <a:buNone/>
-                      </a:pPr>
-                      <a:endParaRPr>
-                        <a:solidFill>
-                          <a:schemeClr val="dk1"/>
-                        </a:solidFill>
-                        <a:latin typeface="Roboto Mono"/>
-                        <a:ea typeface="Roboto Mono"/>
-                        <a:cs typeface="Roboto Mono"/>
-                        <a:sym typeface="Roboto Mono"/>
-                      </a:endParaRPr>
-                    </a:p>
-                  </a:txBody>
-                  <a:tcPr marL="91425" marR="91425" marT="91425" marB="91425" anchor="ctr">
-                    <a:lnL w="19050" cap="flat" cmpd="sng">
-                      <a:solidFill>
-                        <a:schemeClr val="dk1"/>
-                      </a:solidFill>
-                      <a:prstDash val="solid"/>
-                      <a:round/>
-                      <a:headEnd type="none" w="sm" len="sm"/>
-                      <a:tailEnd type="none" w="sm" len="sm"/>
-                    </a:lnL>
-                    <a:lnR w="19050" cap="flat" cmpd="sng">
-                      <a:solidFill>
-                        <a:schemeClr val="dk1"/>
-                      </a:solidFill>
-                      <a:prstDash val="solid"/>
-                      <a:round/>
-                      <a:headEnd type="none" w="sm" len="sm"/>
-                      <a:tailEnd type="none" w="sm" len="sm"/>
-                    </a:lnR>
-                    <a:lnT w="19050" cap="flat" cmpd="sng">
-                      <a:solidFill>
-                        <a:schemeClr val="dk1"/>
-                      </a:solidFill>
-                      <a:prstDash val="solid"/>
-                      <a:round/>
-                      <a:headEnd type="none" w="sm" len="sm"/>
-                      <a:tailEnd type="none" w="sm" len="sm"/>
-                    </a:lnT>
-                    <a:lnB w="19050" cap="flat" cmpd="sng">
-                      <a:solidFill>
-                        <a:schemeClr val="dk1"/>
-                      </a:solidFill>
-                      <a:prstDash val="solid"/>
-                      <a:round/>
-                      <a:headEnd type="none" w="sm" len="sm"/>
-                      <a:tailEnd type="none" w="sm" len="sm"/>
-                    </a:lnB>
-                  </a:tcPr>
-                </a:tc>
-                <a:extLst>
-                  <a:ext uri="{0D108BD9-81ED-4DB2-BD59-A6C34878D82A}">
-                    <a16:rowId xmlns:a16="http://schemas.microsoft.com/office/drawing/2014/main" val="10001"/>
-                  </a:ext>
-                </a:extLst>
-              </a:tr>
-              <a:tr h="620289">
-                <a:tc>
-                  <a:txBody>
-                    <a:bodyPr/>
-                    <a:lstStyle/>
-                    <a:p>
-                      <a:pPr marL="0" marR="0" lvl="0" indent="0" algn="ctr" defTabSz="914400" rtl="0" eaLnBrk="1" fontAlgn="auto" latinLnBrk="0" hangingPunct="1">
-                        <a:lnSpc>
-                          <a:spcPct val="100000"/>
-                        </a:lnSpc>
-                        <a:spcBef>
-                          <a:spcPts val="0"/>
-                        </a:spcBef>
-                        <a:spcAft>
-                          <a:spcPts val="0"/>
-                        </a:spcAft>
-                        <a:buClr>
-                          <a:srgbClr val="000000"/>
-                        </a:buClr>
-                        <a:buSzTx/>
-                        <a:buFont typeface="Arial"/>
-                        <a:buNone/>
-                        <a:tabLst/>
-                        <a:defRPr/>
-                      </a:pPr>
-                      <a:r>
-                        <a:rPr lang="hu-HU" dirty="0">
-                          <a:solidFill>
-                            <a:schemeClr val="accent6"/>
-                          </a:solidFill>
-                          <a:latin typeface="Roboto Mono"/>
-                          <a:ea typeface="Roboto Mono"/>
-                          <a:cs typeface="Roboto Mono"/>
-                          <a:sym typeface="Roboto Mono"/>
-                        </a:rPr>
-                        <a:t>Főoldal</a:t>
-                      </a:r>
-                    </a:p>
-                  </a:txBody>
-                  <a:tcPr marL="91425" marR="91425" marT="91425" marB="91425" anchor="ctr">
-                    <a:lnL w="19050" cap="flat" cmpd="sng">
-                      <a:solidFill>
-                        <a:schemeClr val="dk1"/>
-                      </a:solidFill>
-                      <a:prstDash val="solid"/>
-                      <a:round/>
-                      <a:headEnd type="none" w="sm" len="sm"/>
-                      <a:tailEnd type="none" w="sm" len="sm"/>
-                    </a:lnL>
-                    <a:lnR w="19050" cap="flat" cmpd="sng">
-                      <a:solidFill>
-                        <a:schemeClr val="dk1"/>
-                      </a:solidFill>
-                      <a:prstDash val="solid"/>
-                      <a:round/>
-                      <a:headEnd type="none" w="sm" len="sm"/>
-                      <a:tailEnd type="none" w="sm" len="sm"/>
-                    </a:lnR>
-                    <a:lnT w="19050" cap="flat" cmpd="sng">
-                      <a:solidFill>
-                        <a:schemeClr val="dk1"/>
-                      </a:solidFill>
-                      <a:prstDash val="solid"/>
-                      <a:round/>
-                      <a:headEnd type="none" w="sm" len="sm"/>
-                      <a:tailEnd type="none" w="sm" len="sm"/>
-                    </a:lnT>
-                    <a:lnB w="19050" cap="flat" cmpd="sng">
-                      <a:solidFill>
-                        <a:schemeClr val="dk1"/>
-                      </a:solidFill>
-                      <a:prstDash val="solid"/>
-                      <a:round/>
-                      <a:headEnd type="none" w="sm" len="sm"/>
-                      <a:tailEnd type="none" w="sm" len="sm"/>
-                    </a:lnB>
-                  </a:tcPr>
-                </a:tc>
-                <a:tc>
-                  <a:txBody>
-                    <a:bodyPr/>
-                    <a:lstStyle/>
-                    <a:p>
-                      <a:pPr marL="0" lvl="0" indent="0" algn="ctr" rtl="0">
-                        <a:spcBef>
-                          <a:spcPts val="0"/>
-                        </a:spcBef>
-                        <a:spcAft>
-                          <a:spcPts val="0"/>
-                        </a:spcAft>
-                        <a:buNone/>
-                      </a:pPr>
-                      <a:r>
-                        <a:rPr lang="hu-HU" dirty="0">
-                          <a:solidFill>
-                            <a:schemeClr val="dk1"/>
-                          </a:solidFill>
-                          <a:latin typeface="Roboto Mono"/>
-                          <a:ea typeface="Roboto Mono"/>
-                          <a:cs typeface="Roboto Mono"/>
-                          <a:sym typeface="Roboto Mono"/>
-                        </a:rPr>
-                        <a:t>Mi az</a:t>
-                      </a:r>
-                    </a:p>
-                    <a:p>
-                      <a:pPr marL="0" lvl="0" indent="0" algn="ctr" rtl="0">
-                        <a:spcBef>
-                          <a:spcPts val="0"/>
-                        </a:spcBef>
-                        <a:spcAft>
-                          <a:spcPts val="0"/>
-                        </a:spcAft>
-                        <a:buNone/>
-                      </a:pPr>
-                      <a:r>
-                        <a:rPr lang="hu-HU" dirty="0">
-                          <a:solidFill>
-                            <a:schemeClr val="dk1"/>
-                          </a:solidFill>
-                          <a:latin typeface="Roboto Mono"/>
-                          <a:ea typeface="Roboto Mono"/>
-                          <a:cs typeface="Roboto Mono"/>
-                          <a:sym typeface="Roboto Mono"/>
-                        </a:rPr>
-                        <a:t>a</a:t>
-                      </a:r>
-                    </a:p>
-                    <a:p>
-                      <a:pPr marL="0" lvl="0" indent="0" algn="ctr" rtl="0">
-                        <a:spcBef>
-                          <a:spcPts val="0"/>
-                        </a:spcBef>
-                        <a:spcAft>
-                          <a:spcPts val="0"/>
-                        </a:spcAft>
-                        <a:buNone/>
-                      </a:pPr>
-                      <a:r>
-                        <a:rPr lang="hu-HU" dirty="0">
-                          <a:solidFill>
-                            <a:schemeClr val="dk1"/>
-                          </a:solidFill>
-                          <a:latin typeface="Roboto Mono"/>
-                          <a:ea typeface="Roboto Mono"/>
-                          <a:cs typeface="Roboto Mono"/>
-                          <a:sym typeface="Roboto Mono"/>
-                        </a:rPr>
-                        <a:t>játékfüggőség?</a:t>
-                      </a:r>
-                      <a:endParaRPr dirty="0">
-                        <a:solidFill>
-                          <a:schemeClr val="dk1"/>
-                        </a:solidFill>
-                        <a:latin typeface="Roboto Mono"/>
-                        <a:ea typeface="Roboto Mono"/>
-                        <a:cs typeface="Roboto Mono"/>
-                        <a:sym typeface="Roboto Mono"/>
-                      </a:endParaRPr>
-                    </a:p>
-                  </a:txBody>
-                  <a:tcPr marL="91425" marR="91425" marT="91425" marB="91425" anchor="ctr">
-                    <a:lnL w="19050" cap="flat" cmpd="sng">
-                      <a:solidFill>
-                        <a:schemeClr val="dk1"/>
-                      </a:solidFill>
-                      <a:prstDash val="solid"/>
-                      <a:round/>
-                      <a:headEnd type="none" w="sm" len="sm"/>
-                      <a:tailEnd type="none" w="sm" len="sm"/>
-                    </a:lnL>
-                    <a:lnR w="19050" cap="flat" cmpd="sng">
-                      <a:solidFill>
-                        <a:schemeClr val="dk1"/>
-                      </a:solidFill>
-                      <a:prstDash val="solid"/>
-                      <a:round/>
-                      <a:headEnd type="none" w="sm" len="sm"/>
-                      <a:tailEnd type="none" w="sm" len="sm"/>
-                    </a:lnR>
-                    <a:lnT w="19050" cap="flat" cmpd="sng">
-                      <a:solidFill>
-                        <a:schemeClr val="dk1"/>
-                      </a:solidFill>
-                      <a:prstDash val="solid"/>
-                      <a:round/>
-                      <a:headEnd type="none" w="sm" len="sm"/>
-                      <a:tailEnd type="none" w="sm" len="sm"/>
-                    </a:lnT>
-                    <a:lnB w="19050" cap="flat" cmpd="sng">
-                      <a:solidFill>
-                        <a:schemeClr val="dk1"/>
-                      </a:solidFill>
-                      <a:prstDash val="solid"/>
-                      <a:round/>
-                      <a:headEnd type="none" w="sm" len="sm"/>
-                      <a:tailEnd type="none" w="sm" len="sm"/>
-                    </a:lnB>
-                  </a:tcPr>
-                </a:tc>
-                <a:tc>
-                  <a:txBody>
-                    <a:bodyPr/>
-                    <a:lstStyle/>
-                    <a:p>
-                      <a:pPr marL="0" lvl="0" indent="0" algn="ctr" rtl="0">
-                        <a:spcBef>
-                          <a:spcPts val="0"/>
-                        </a:spcBef>
-                        <a:spcAft>
-                          <a:spcPts val="0"/>
-                        </a:spcAft>
-                        <a:buNone/>
-                      </a:pPr>
-                      <a:r>
-                        <a:rPr lang="hu-HU" dirty="0">
-                          <a:solidFill>
-                            <a:schemeClr val="dk1"/>
-                          </a:solidFill>
-                          <a:latin typeface="Roboto Mono"/>
-                          <a:ea typeface="Roboto Mono"/>
-                          <a:cs typeface="Roboto Mono"/>
-                          <a:sym typeface="Roboto Mono"/>
-                        </a:rPr>
-                        <a:t>Kutatások</a:t>
-                      </a:r>
-                      <a:endParaRPr dirty="0">
-                        <a:solidFill>
-                          <a:schemeClr val="dk1"/>
-                        </a:solidFill>
-                        <a:latin typeface="Roboto Mono"/>
-                        <a:ea typeface="Roboto Mono"/>
-                        <a:cs typeface="Roboto Mono"/>
-                        <a:sym typeface="Roboto Mono"/>
-                      </a:endParaRPr>
-                    </a:p>
-                  </a:txBody>
-                  <a:tcPr marL="91425" marR="91425" marT="91425" marB="91425" anchor="ctr">
-                    <a:lnL w="19050" cap="flat" cmpd="sng">
-                      <a:solidFill>
-                        <a:schemeClr val="dk1"/>
-                      </a:solidFill>
-                      <a:prstDash val="solid"/>
-                      <a:round/>
-                      <a:headEnd type="none" w="sm" len="sm"/>
-                      <a:tailEnd type="none" w="sm" len="sm"/>
-                    </a:lnL>
-                    <a:lnR w="19050" cap="flat" cmpd="sng">
-                      <a:solidFill>
-                        <a:schemeClr val="dk1"/>
-                      </a:solidFill>
-                      <a:prstDash val="solid"/>
-                      <a:round/>
-                      <a:headEnd type="none" w="sm" len="sm"/>
-                      <a:tailEnd type="none" w="sm" len="sm"/>
-                    </a:lnR>
-                    <a:lnT w="19050" cap="flat" cmpd="sng">
-                      <a:solidFill>
-                        <a:schemeClr val="dk1"/>
-                      </a:solidFill>
-                      <a:prstDash val="solid"/>
-                      <a:round/>
-                      <a:headEnd type="none" w="sm" len="sm"/>
-                      <a:tailEnd type="none" w="sm" len="sm"/>
-                    </a:lnT>
-                    <a:lnB w="19050" cap="flat" cmpd="sng">
-                      <a:solidFill>
-                        <a:schemeClr val="dk1"/>
-                      </a:solidFill>
-                      <a:prstDash val="solid"/>
-                      <a:round/>
-                      <a:headEnd type="none" w="sm" len="sm"/>
-                      <a:tailEnd type="none" w="sm" len="sm"/>
-                    </a:lnB>
-                  </a:tcPr>
-                </a:tc>
-                <a:tc>
-                  <a:txBody>
-                    <a:bodyPr/>
-                    <a:lstStyle/>
-                    <a:p>
-                      <a:pPr marL="0" lvl="0" indent="0" algn="ctr" rtl="0">
-                        <a:spcBef>
-                          <a:spcPts val="0"/>
-                        </a:spcBef>
-                        <a:spcAft>
-                          <a:spcPts val="0"/>
-                        </a:spcAft>
-                        <a:buNone/>
-                      </a:pPr>
-                      <a:r>
-                        <a:rPr lang="hu-HU" dirty="0">
-                          <a:solidFill>
-                            <a:schemeClr val="dk1"/>
-                          </a:solidFill>
-                          <a:latin typeface="Roboto Mono"/>
-                          <a:ea typeface="Roboto Mono"/>
-                          <a:cs typeface="Roboto Mono"/>
-                          <a:sym typeface="Roboto Mono"/>
-                        </a:rPr>
-                        <a:t>Hivatalosan is betegség</a:t>
-                      </a:r>
-                      <a:endParaRPr dirty="0">
-                        <a:solidFill>
-                          <a:schemeClr val="dk1"/>
-                        </a:solidFill>
-                        <a:latin typeface="Roboto Mono"/>
-                        <a:ea typeface="Roboto Mono"/>
-                        <a:cs typeface="Roboto Mono"/>
-                        <a:sym typeface="Roboto Mono"/>
-                      </a:endParaRPr>
-                    </a:p>
-                  </a:txBody>
-                  <a:tcPr marL="91425" marR="91425" marT="91425" marB="91425" anchor="ctr">
-                    <a:lnL w="19050" cap="flat" cmpd="sng">
-                      <a:solidFill>
-                        <a:schemeClr val="dk1"/>
-                      </a:solidFill>
-                      <a:prstDash val="solid"/>
-                      <a:round/>
-                      <a:headEnd type="none" w="sm" len="sm"/>
-                      <a:tailEnd type="none" w="sm" len="sm"/>
-                    </a:lnL>
-                    <a:lnR w="19050" cap="flat" cmpd="sng">
-                      <a:solidFill>
-                        <a:schemeClr val="dk1"/>
-                      </a:solidFill>
-                      <a:prstDash val="solid"/>
-                      <a:round/>
-                      <a:headEnd type="none" w="sm" len="sm"/>
-                      <a:tailEnd type="none" w="sm" len="sm"/>
-                    </a:lnR>
-                    <a:lnT w="19050" cap="flat" cmpd="sng">
-                      <a:solidFill>
-                        <a:schemeClr val="dk1"/>
-                      </a:solidFill>
-                      <a:prstDash val="solid"/>
-                      <a:round/>
-                      <a:headEnd type="none" w="sm" len="sm"/>
-                      <a:tailEnd type="none" w="sm" len="sm"/>
-                    </a:lnT>
-                    <a:lnB w="19050" cap="flat" cmpd="sng">
-                      <a:solidFill>
-                        <a:schemeClr val="dk1"/>
-                      </a:solidFill>
-                      <a:prstDash val="solid"/>
-                      <a:round/>
-                      <a:headEnd type="none" w="sm" len="sm"/>
-                      <a:tailEnd type="none" w="sm" len="sm"/>
-                    </a:lnB>
-                  </a:tcPr>
-                </a:tc>
-                <a:tc>
-                  <a:txBody>
-                    <a:bodyPr/>
-                    <a:lstStyle/>
-                    <a:p>
-                      <a:pPr marL="0" lvl="0" indent="0" algn="ctr" rtl="0">
-                        <a:spcBef>
-                          <a:spcPts val="0"/>
-                        </a:spcBef>
-                        <a:spcAft>
-                          <a:spcPts val="0"/>
-                        </a:spcAft>
-                        <a:buNone/>
-                      </a:pPr>
-                      <a:r>
-                        <a:rPr lang="hu-HU" dirty="0">
-                          <a:solidFill>
-                            <a:schemeClr val="dk1"/>
-                          </a:solidFill>
-                          <a:latin typeface="Roboto Mono"/>
-                          <a:ea typeface="Roboto Mono"/>
-                          <a:cs typeface="Roboto Mono"/>
-                          <a:sym typeface="Roboto Mono"/>
-                        </a:rPr>
-                        <a:t>Tudnivalók</a:t>
-                      </a:r>
-                      <a:endParaRPr dirty="0">
-                        <a:solidFill>
-                          <a:schemeClr val="dk1"/>
-                        </a:solidFill>
-                        <a:latin typeface="Roboto Mono"/>
-                        <a:ea typeface="Roboto Mono"/>
-                        <a:cs typeface="Roboto Mono"/>
-                        <a:sym typeface="Roboto Mono"/>
-                      </a:endParaRPr>
-                    </a:p>
-                  </a:txBody>
-                  <a:tcPr marL="91425" marR="91425" marT="91425" marB="91425" anchor="ctr">
-                    <a:lnL w="19050" cap="flat" cmpd="sng">
-                      <a:solidFill>
-                        <a:schemeClr val="dk1"/>
-                      </a:solidFill>
-                      <a:prstDash val="solid"/>
-                      <a:round/>
-                      <a:headEnd type="none" w="sm" len="sm"/>
-                      <a:tailEnd type="none" w="sm" len="sm"/>
-                    </a:lnL>
-                    <a:lnR w="19050" cap="flat" cmpd="sng" algn="ctr">
-                      <a:solidFill>
-                        <a:schemeClr val="dk1"/>
-                      </a:solidFill>
-                      <a:prstDash val="solid"/>
-                      <a:round/>
-                      <a:headEnd type="none" w="sm" len="sm"/>
-                      <a:tailEnd type="none" w="sm" len="sm"/>
-                    </a:lnR>
-                    <a:lnT w="19050" cap="flat" cmpd="sng">
-                      <a:solidFill>
-                        <a:schemeClr val="dk1"/>
-                      </a:solidFill>
-                      <a:prstDash val="solid"/>
-                      <a:round/>
-                      <a:headEnd type="none" w="sm" len="sm"/>
-                      <a:tailEnd type="none" w="sm" len="sm"/>
-                    </a:lnT>
-                    <a:lnB w="19050" cap="flat" cmpd="sng" algn="ctr">
-                      <a:solidFill>
-                        <a:schemeClr val="dk1"/>
-                      </a:solidFill>
-                      <a:prstDash val="solid"/>
-                      <a:round/>
-                      <a:headEnd type="none" w="sm" len="sm"/>
-                      <a:tailEnd type="none" w="sm" len="sm"/>
-                    </a:lnB>
-                  </a:tcPr>
-                </a:tc>
-                <a:extLst>
-                  <a:ext uri="{0D108BD9-81ED-4DB2-BD59-A6C34878D82A}">
-                    <a16:rowId xmlns:a16="http://schemas.microsoft.com/office/drawing/2014/main" val="10002"/>
-                  </a:ext>
-                </a:extLst>
-              </a:tr>
-              <a:tr h="609575">
-                <a:tc>
-                  <a:txBody>
-                    <a:bodyPr/>
-                    <a:lstStyle/>
-                    <a:p>
-                      <a:pPr marL="0" lvl="0" indent="0" algn="ctr" rtl="0">
-                        <a:spcBef>
-                          <a:spcPts val="0"/>
-                        </a:spcBef>
-                        <a:spcAft>
-                          <a:spcPts val="0"/>
-                        </a:spcAft>
-                        <a:buNone/>
-                      </a:pPr>
-                      <a:r>
-                        <a:rPr lang="hu-HU" dirty="0">
-                          <a:solidFill>
-                            <a:schemeClr val="accent6"/>
-                          </a:solidFill>
-                          <a:latin typeface="Roboto Mono"/>
-                          <a:ea typeface="Roboto Mono"/>
-                          <a:cs typeface="Roboto Mono"/>
-                          <a:sym typeface="Roboto Mono"/>
-                        </a:rPr>
-                        <a:t>Mellékoldalak</a:t>
-                      </a:r>
-                      <a:endParaRPr dirty="0">
-                        <a:solidFill>
-                          <a:schemeClr val="accent6"/>
-                        </a:solidFill>
-                        <a:latin typeface="Roboto Mono"/>
-                        <a:ea typeface="Roboto Mono"/>
-                        <a:cs typeface="Roboto Mono"/>
-                        <a:sym typeface="Roboto Mono"/>
-                      </a:endParaRPr>
-                    </a:p>
-                  </a:txBody>
-                  <a:tcPr marL="91425" marR="91425" marT="91425" marB="91425" anchor="ctr">
-                    <a:lnL w="19050" cap="flat" cmpd="sng">
-                      <a:solidFill>
-                        <a:schemeClr val="dk1"/>
-                      </a:solidFill>
-                      <a:prstDash val="solid"/>
-                      <a:round/>
-                      <a:headEnd type="none" w="sm" len="sm"/>
-                      <a:tailEnd type="none" w="sm" len="sm"/>
-                    </a:lnL>
-                    <a:lnR w="19050" cap="flat" cmpd="sng">
-                      <a:solidFill>
-                        <a:schemeClr val="dk1"/>
-                      </a:solidFill>
-                      <a:prstDash val="solid"/>
-                      <a:round/>
-                      <a:headEnd type="none" w="sm" len="sm"/>
-                      <a:tailEnd type="none" w="sm" len="sm"/>
-                    </a:lnR>
-                    <a:lnT w="19050" cap="flat" cmpd="sng">
-                      <a:solidFill>
-                        <a:schemeClr val="dk1"/>
-                      </a:solidFill>
-                      <a:prstDash val="solid"/>
-                      <a:round/>
-                      <a:headEnd type="none" w="sm" len="sm"/>
-                      <a:tailEnd type="none" w="sm" len="sm"/>
-                    </a:lnT>
-                    <a:lnB w="19050" cap="flat" cmpd="sng">
-                      <a:solidFill>
-                        <a:schemeClr val="dk1"/>
-                      </a:solidFill>
-                      <a:prstDash val="solid"/>
-                      <a:round/>
-                      <a:headEnd type="none" w="sm" len="sm"/>
-                      <a:tailEnd type="none" w="sm" len="sm"/>
-                    </a:lnB>
-                  </a:tcPr>
-                </a:tc>
-                <a:tc>
-                  <a:txBody>
-                    <a:bodyPr/>
-                    <a:lstStyle/>
-                    <a:p>
-                      <a:pPr marL="0" lvl="0" indent="0" algn="ctr" rtl="0">
-                        <a:spcBef>
-                          <a:spcPts val="0"/>
-                        </a:spcBef>
-                        <a:spcAft>
-                          <a:spcPts val="0"/>
-                        </a:spcAft>
-                        <a:buNone/>
-                      </a:pPr>
-                      <a:r>
-                        <a:rPr lang="hu-HU" dirty="0">
-                          <a:solidFill>
-                            <a:schemeClr val="dk1"/>
-                          </a:solidFill>
-                          <a:latin typeface="Roboto Mono"/>
-                          <a:ea typeface="Roboto Mono"/>
-                          <a:cs typeface="Roboto Mono"/>
-                          <a:sym typeface="Roboto Mono"/>
-                        </a:rPr>
-                        <a:t>Kialakulása</a:t>
-                      </a:r>
-                      <a:endParaRPr dirty="0">
-                        <a:solidFill>
-                          <a:schemeClr val="dk1"/>
-                        </a:solidFill>
-                        <a:latin typeface="Roboto Mono"/>
-                        <a:ea typeface="Roboto Mono"/>
-                        <a:cs typeface="Roboto Mono"/>
-                        <a:sym typeface="Roboto Mono"/>
-                      </a:endParaRPr>
-                    </a:p>
-                  </a:txBody>
-                  <a:tcPr marL="91425" marR="91425" marT="91425" marB="91425" anchor="ctr">
-                    <a:lnL w="19050" cap="flat" cmpd="sng">
-                      <a:solidFill>
-                        <a:schemeClr val="dk1"/>
-                      </a:solidFill>
-                      <a:prstDash val="solid"/>
-                      <a:round/>
-                      <a:headEnd type="none" w="sm" len="sm"/>
-                      <a:tailEnd type="none" w="sm" len="sm"/>
-                    </a:lnL>
-                    <a:lnR w="19050" cap="flat" cmpd="sng">
-                      <a:solidFill>
-                        <a:schemeClr val="dk1"/>
-                      </a:solidFill>
-                      <a:prstDash val="solid"/>
-                      <a:round/>
-                      <a:headEnd type="none" w="sm" len="sm"/>
-                      <a:tailEnd type="none" w="sm" len="sm"/>
-                    </a:lnR>
-                    <a:lnT w="19050" cap="flat" cmpd="sng">
-                      <a:solidFill>
-                        <a:schemeClr val="dk1"/>
-                      </a:solidFill>
-                      <a:prstDash val="solid"/>
-                      <a:round/>
-                      <a:headEnd type="none" w="sm" len="sm"/>
-                      <a:tailEnd type="none" w="sm" len="sm"/>
-                    </a:lnT>
-                    <a:lnB w="19050" cap="flat" cmpd="sng">
-                      <a:solidFill>
-                        <a:schemeClr val="dk1"/>
-                      </a:solidFill>
-                      <a:prstDash val="solid"/>
-                      <a:round/>
-                      <a:headEnd type="none" w="sm" len="sm"/>
-                      <a:tailEnd type="none" w="sm" len="sm"/>
-                    </a:lnB>
-                  </a:tcPr>
-                </a:tc>
-                <a:tc>
-                  <a:txBody>
-                    <a:bodyPr/>
-                    <a:lstStyle/>
-                    <a:p>
-                      <a:pPr marL="0" lvl="0" indent="0" algn="ctr" rtl="0">
-                        <a:spcBef>
-                          <a:spcPts val="0"/>
-                        </a:spcBef>
-                        <a:spcAft>
-                          <a:spcPts val="0"/>
-                        </a:spcAft>
-                        <a:buNone/>
-                      </a:pPr>
-                      <a:r>
-                        <a:rPr lang="hu-HU" dirty="0">
-                          <a:solidFill>
-                            <a:schemeClr val="dk1"/>
-                          </a:solidFill>
-                          <a:latin typeface="Roboto Mono"/>
-                          <a:ea typeface="Roboto Mono"/>
-                          <a:cs typeface="Roboto Mono"/>
-                          <a:sym typeface="Roboto Mono"/>
-                        </a:rPr>
-                        <a:t>Kezelése</a:t>
-                      </a:r>
-                      <a:endParaRPr dirty="0">
-                        <a:solidFill>
-                          <a:schemeClr val="dk1"/>
-                        </a:solidFill>
-                        <a:latin typeface="Roboto Mono"/>
-                        <a:ea typeface="Roboto Mono"/>
-                        <a:cs typeface="Roboto Mono"/>
-                        <a:sym typeface="Roboto Mono"/>
-                      </a:endParaRPr>
-                    </a:p>
-                  </a:txBody>
-                  <a:tcPr marL="91425" marR="91425" marT="91425" marB="91425" anchor="ctr">
-                    <a:lnL w="19050" cap="flat" cmpd="sng">
-                      <a:solidFill>
-                        <a:schemeClr val="dk1"/>
-                      </a:solidFill>
-                      <a:prstDash val="solid"/>
-                      <a:round/>
-                      <a:headEnd type="none" w="sm" len="sm"/>
-                      <a:tailEnd type="none" w="sm" len="sm"/>
-                    </a:lnL>
-                    <a:lnR w="19050" cap="flat" cmpd="sng">
-                      <a:solidFill>
-                        <a:schemeClr val="dk1"/>
-                      </a:solidFill>
-                      <a:prstDash val="solid"/>
-                      <a:round/>
-                      <a:headEnd type="none" w="sm" len="sm"/>
-                      <a:tailEnd type="none" w="sm" len="sm"/>
-                    </a:lnR>
-                    <a:lnT w="19050" cap="flat" cmpd="sng">
-                      <a:solidFill>
-                        <a:schemeClr val="dk1"/>
-                      </a:solidFill>
-                      <a:prstDash val="solid"/>
-                      <a:round/>
-                      <a:headEnd type="none" w="sm" len="sm"/>
-                      <a:tailEnd type="none" w="sm" len="sm"/>
-                    </a:lnT>
-                    <a:lnB w="19050" cap="flat" cmpd="sng">
-                      <a:solidFill>
-                        <a:schemeClr val="dk1"/>
-                      </a:solidFill>
-                      <a:prstDash val="solid"/>
-                      <a:round/>
-                      <a:headEnd type="none" w="sm" len="sm"/>
-                      <a:tailEnd type="none" w="sm" len="sm"/>
-                    </a:lnB>
-                  </a:tcPr>
-                </a:tc>
-                <a:tc>
-                  <a:txBody>
-                    <a:bodyPr/>
-                    <a:lstStyle/>
-                    <a:p>
-                      <a:pPr marL="0" lvl="0" indent="0" algn="ctr" rtl="0">
-                        <a:spcBef>
-                          <a:spcPts val="0"/>
-                        </a:spcBef>
-                        <a:spcAft>
-                          <a:spcPts val="0"/>
-                        </a:spcAft>
-                        <a:buNone/>
-                      </a:pPr>
-                      <a:r>
-                        <a:rPr lang="hu-HU" dirty="0">
-                          <a:solidFill>
-                            <a:schemeClr val="dk1"/>
-                          </a:solidFill>
-                          <a:latin typeface="Roboto Mono"/>
-                          <a:ea typeface="Roboto Mono"/>
-                          <a:cs typeface="Roboto Mono"/>
-                          <a:sym typeface="Roboto Mono"/>
-                        </a:rPr>
-                        <a:t>Következményei</a:t>
-                      </a:r>
-                      <a:endParaRPr dirty="0">
-                        <a:solidFill>
-                          <a:schemeClr val="dk1"/>
-                        </a:solidFill>
-                        <a:latin typeface="Roboto Mono"/>
-                        <a:ea typeface="Roboto Mono"/>
-                        <a:cs typeface="Roboto Mono"/>
-                        <a:sym typeface="Roboto Mono"/>
-                      </a:endParaRPr>
-                    </a:p>
-                  </a:txBody>
-                  <a:tcPr marL="91425" marR="91425" marT="91425" marB="91425" anchor="ctr">
-                    <a:lnL w="19050" cap="flat" cmpd="sng">
-                      <a:solidFill>
-                        <a:schemeClr val="dk1"/>
-                      </a:solidFill>
-                      <a:prstDash val="solid"/>
-                      <a:round/>
-                      <a:headEnd type="none" w="sm" len="sm"/>
-                      <a:tailEnd type="none" w="sm" len="sm"/>
-                    </a:lnL>
-                    <a:lnR w="19050" cap="flat" cmpd="sng">
-                      <a:solidFill>
-                        <a:schemeClr val="dk1"/>
-                      </a:solidFill>
-                      <a:prstDash val="solid"/>
-                      <a:round/>
-                      <a:headEnd type="none" w="sm" len="sm"/>
-                      <a:tailEnd type="none" w="sm" len="sm"/>
-                    </a:lnR>
-                    <a:lnT w="19050" cap="flat" cmpd="sng">
-                      <a:solidFill>
-                        <a:schemeClr val="dk1"/>
-                      </a:solidFill>
-                      <a:prstDash val="solid"/>
-                      <a:round/>
-                      <a:headEnd type="none" w="sm" len="sm"/>
-                      <a:tailEnd type="none" w="sm" len="sm"/>
-                    </a:lnT>
-                    <a:lnB w="19050" cap="flat" cmpd="sng">
-                      <a:solidFill>
-                        <a:schemeClr val="dk1"/>
-                      </a:solidFill>
-                      <a:prstDash val="solid"/>
-                      <a:round/>
-                      <a:headEnd type="none" w="sm" len="sm"/>
-                      <a:tailEnd type="none" w="sm" len="sm"/>
-                    </a:lnB>
-                  </a:tcPr>
-                </a:tc>
-                <a:tc>
-                  <a:txBody>
-                    <a:bodyPr/>
-                    <a:lstStyle/>
-                    <a:p>
-                      <a:pPr marL="0" lvl="0" indent="0" algn="ctr" rtl="0">
-                        <a:spcBef>
-                          <a:spcPts val="0"/>
-                        </a:spcBef>
-                        <a:spcAft>
-                          <a:spcPts val="0"/>
-                        </a:spcAft>
-                        <a:buNone/>
-                      </a:pPr>
-                      <a:r>
-                        <a:rPr lang="hu-HU" dirty="0">
-                          <a:solidFill>
-                            <a:schemeClr val="dk1"/>
-                          </a:solidFill>
-                          <a:latin typeface="Roboto Mono"/>
-                          <a:ea typeface="Roboto Mono"/>
-                          <a:cs typeface="Roboto Mono"/>
-                          <a:sym typeface="Roboto Mono"/>
-                        </a:rPr>
-                        <a:t>Források</a:t>
-                      </a:r>
-                      <a:endParaRPr dirty="0">
-                        <a:solidFill>
-                          <a:schemeClr val="dk1"/>
-                        </a:solidFill>
-                        <a:latin typeface="Roboto Mono"/>
-                        <a:ea typeface="Roboto Mono"/>
-                        <a:cs typeface="Roboto Mono"/>
-                        <a:sym typeface="Roboto Mono"/>
-                      </a:endParaRPr>
-                    </a:p>
-                  </a:txBody>
-                  <a:tcPr marL="91425" marR="91425" marT="91425" marB="91425" anchor="ctr">
-                    <a:lnL w="19050" cap="flat" cmpd="sng">
-                      <a:solidFill>
-                        <a:schemeClr val="dk1"/>
-                      </a:solidFill>
-                      <a:prstDash val="solid"/>
-                      <a:round/>
-                      <a:headEnd type="none" w="sm" len="sm"/>
-                      <a:tailEnd type="none" w="sm" len="sm"/>
-                    </a:lnL>
-                    <a:lnR w="19050" cap="flat" cmpd="sng" algn="ctr">
-                      <a:solidFill>
-                        <a:schemeClr val="dk1"/>
-                      </a:solidFill>
-                      <a:prstDash val="solid"/>
-                      <a:round/>
-                      <a:headEnd type="none" w="sm" len="sm"/>
-                      <a:tailEnd type="none" w="sm" len="sm"/>
-                    </a:lnR>
-                    <a:lnT w="19050" cap="flat" cmpd="sng">
-                      <a:solidFill>
-                        <a:schemeClr val="dk1"/>
-                      </a:solidFill>
-                      <a:prstDash val="solid"/>
-                      <a:round/>
-                      <a:headEnd type="none" w="sm" len="sm"/>
-                      <a:tailEnd type="none" w="sm" len="sm"/>
-                    </a:lnT>
-                    <a:lnB w="19050" cap="flat" cmpd="sng" algn="ctr">
-                      <a:solidFill>
-                        <a:schemeClr val="dk1"/>
-                      </a:solidFill>
-                      <a:prstDash val="solid"/>
-                      <a:round/>
-                      <a:headEnd type="none" w="sm" len="sm"/>
-                      <a:tailEnd type="none" w="sm" len="sm"/>
-                    </a:lnB>
-                  </a:tcPr>
-                </a:tc>
-                <a:extLst>
-                  <a:ext uri="{0D108BD9-81ED-4DB2-BD59-A6C34878D82A}">
-                    <a16:rowId xmlns:a16="http://schemas.microsoft.com/office/drawing/2014/main" val="10003"/>
-                  </a:ext>
-                </a:extLst>
-              </a:tr>
-            </a:tbl>
-          </a:graphicData>
-        </a:graphic>
-      </p:graphicFrame>
+        </p:nvPicPr>
+        <p:blipFill>
+          <a:blip r:embed="rId3">
+            <a:alphaModFix amt="56000"/>
+          </a:blip>
+          <a:stretch>
+            <a:fillRect/>
+          </a:stretch>
+        </p:blipFill>
+        <p:spPr>
+          <a:xfrm rot="10800000">
+            <a:off x="4943061" y="1501016"/>
+            <a:ext cx="2505700" cy="282325"/>
+          </a:xfrm>
+          <a:prstGeom prst="rect">
+            <a:avLst/>
+          </a:prstGeom>
+          <a:noFill/>
+          <a:ln>
+            <a:noFill/>
+          </a:ln>
+        </p:spPr>
+      </p:pic>
+      <p:pic>
+        <p:nvPicPr>
+          <p:cNvPr id="4" name="Kép 3">
+            <a:extLst>
+              <a:ext uri="{FF2B5EF4-FFF2-40B4-BE49-F238E27FC236}">
+                <a16:creationId xmlns:a16="http://schemas.microsoft.com/office/drawing/2014/main" id="{54BD4BBA-1BF7-C6A7-B38F-D4322C1FA3CA}"/>
+              </a:ext>
+            </a:extLst>
+          </p:cNvPr>
+          <p:cNvPicPr>
+            <a:picLocks noChangeAspect="1"/>
+          </p:cNvPicPr>
+          <p:nvPr/>
+        </p:nvPicPr>
+        <p:blipFill>
+          <a:blip r:embed="rId4"/>
+          <a:stretch>
+            <a:fillRect/>
+          </a:stretch>
+        </p:blipFill>
+        <p:spPr>
+          <a:xfrm>
+            <a:off x="5300779" y="1841282"/>
+            <a:ext cx="2359720" cy="2552973"/>
+          </a:xfrm>
+          <a:prstGeom prst="rect">
+            <a:avLst/>
+          </a:prstGeom>
+        </p:spPr>
+      </p:pic>
+      <p:pic>
+        <p:nvPicPr>
+          <p:cNvPr id="3074" name="Picture 2" descr="FUNNY FACES">
+            <a:extLst>
+              <a:ext uri="{FF2B5EF4-FFF2-40B4-BE49-F238E27FC236}">
+                <a16:creationId xmlns:a16="http://schemas.microsoft.com/office/drawing/2014/main" id="{DAB2566A-F839-CEFB-4A1F-8C4DD13E0F8D}"/>
+              </a:ext>
+            </a:extLst>
+          </p:cNvPr>
+          <p:cNvPicPr>
+            <a:picLocks noChangeAspect="1" noChangeArrowheads="1"/>
+          </p:cNvPicPr>
+          <p:nvPr/>
+        </p:nvPicPr>
+        <p:blipFill>
+          <a:blip r:embed="rId5">
+            <a:extLst>
+              <a:ext uri="{28A0092B-C50C-407E-A947-70E740481C1C}">
+                <a14:useLocalDpi xmlns:a14="http://schemas.microsoft.com/office/drawing/2010/main" val="0"/>
+              </a:ext>
+            </a:extLst>
+          </a:blip>
+          <a:srcRect/>
+          <a:stretch>
+            <a:fillRect/>
+          </a:stretch>
+        </p:blipFill>
+        <p:spPr bwMode="auto">
+          <a:xfrm>
+            <a:off x="309658" y="106422"/>
+            <a:ext cx="3330580" cy="5295247"/>
+          </a:xfrm>
+          <a:prstGeom prst="rect">
+            <a:avLst/>
+          </a:prstGeom>
+          <a:noFill/>
+          <a:extLst>
+            <a:ext uri="{909E8E84-426E-40DD-AFC4-6F175D3DCCD1}">
+              <a14:hiddenFill xmlns:a14="http://schemas.microsoft.com/office/drawing/2010/main">
+                <a:solidFill>
+                  <a:srgbClr val="FFFFFF"/>
+                </a:solidFill>
+              </a14:hiddenFill>
+            </a:ext>
+          </a:extLst>
+        </p:spPr>
+      </p:pic>
     </p:spTree>
     <p:extLst>
       <p:ext uri="{BB962C8B-B14F-4D97-AF65-F5344CB8AC3E}">
-        <p14:creationId xmlns:p14="http://schemas.microsoft.com/office/powerpoint/2010/main" val="725697842"/>
+        <p14:creationId xmlns:p14="http://schemas.microsoft.com/office/powerpoint/2010/main" val="4177056089"/>
       </p:ext>
     </p:extLst>
   </p:cSld>
   <p:clrMapOvr>
     <a:masterClrMapping/>
   </p:clrMapOvr>
-  <p:timing>
-    <p:tnLst>
-      <p:par>
-        <p:cTn id="1" dur="indefinite" restart="never" nodeType="tmRoot">
-          <p:childTnLst>
-            <p:seq concurrent="1" nextAc="seek">
-              <p:cTn id="2" dur="indefinite" nodeType="mainSeq">
-                <p:childTnLst>
-                  <p:par>
-                    <p:cTn id="3" fill="hold">
-                      <p:stCondLst>
-                        <p:cond delay="indefinite"/>
-                        <p:cond evt="onBegin" delay="0">
-                          <p:tn val="2"/>
-                        </p:cond>
-                      </p:stCondLst>
-                      <p:childTnLst>
-                        <p:par>
-                          <p:cTn id="4" fill="hold">
-                            <p:stCondLst>
-                              <p:cond delay="0"/>
-                            </p:stCondLst>
-                            <p:childTnLst>
-                              <p:par>
-                                <p:cTn id="5" presetID="10" presetClass="entr" presetSubtype="0" fill="hold" nodeType="afterEffect">
-                                  <p:stCondLst>
-                                    <p:cond delay="0"/>
-                                  </p:stCondLst>
-                                  <p:childTnLst>
-                                    <p:set>
-                                      <p:cBhvr>
-                                        <p:cTn id="6" dur="1" fill="hold">
-                                          <p:stCondLst>
-                                            <p:cond delay="0"/>
-                                          </p:stCondLst>
-                                        </p:cTn>
-                                        <p:tgtEl>
-                                          <p:spTgt spid="965"/>
-                                        </p:tgtEl>
-                                        <p:attrNameLst>
-                                          <p:attrName>style.visibility</p:attrName>
-                                        </p:attrNameLst>
-                                      </p:cBhvr>
-                                      <p:to>
-                                        <p:strVal val="visible"/>
-                                      </p:to>
-                                    </p:set>
-                                    <p:animEffect transition="in" filter="fade">
-                                      <p:cBhvr>
-                                        <p:cTn id="7" dur="1000"/>
-                                        <p:tgtEl>
-                                          <p:spTgt spid="965"/>
-                                        </p:tgtEl>
-                                      </p:cBhvr>
-                                    </p:animEffect>
-                                  </p:childTnLst>
-                                </p:cTn>
-                              </p:par>
-                            </p:childTnLst>
-                          </p:cTn>
-                        </p:par>
-                      </p:childTnLst>
-                    </p:cTn>
-                  </p:par>
-                </p:childTnLst>
-              </p:cTn>
-              <p:prevCondLst>
-                <p:cond evt="onPrev" delay="0">
-                  <p:tgtEl>
-                    <p:sldTgt/>
-                  </p:tgtEl>
-                </p:cond>
-              </p:prevCondLst>
-              <p:nextCondLst>
-                <p:cond evt="onNext" delay="0">
-                  <p:tgtEl>
-                    <p:sldTgt/>
-                  </p:tgtEl>
-                </p:cond>
-              </p:nextCondLst>
-            </p:seq>
-          </p:childTnLst>
-        </p:cTn>
-      </p:par>
-    </p:tnLst>
-  </p:timing>
 </p:sld>
 </file>
 
 <file path=ppt/slides/slide7.xml><?xml version="1.0" encoding="utf-8"?>
+<p:sld xmlns:a="http://schemas.openxmlformats.org/drawingml/2006/main" xmlns:r="http://schemas.openxmlformats.org/officeDocument/2006/relationships" xmlns:p="http://schemas.openxmlformats.org/presentationml/2006/main">
+  <p:cSld>
+    <p:spTree>
+      <p:nvGrpSpPr>
+        <p:cNvPr id="1" name="Shape 1121"/>
+        <p:cNvGrpSpPr/>
+        <p:nvPr/>
+      </p:nvGrpSpPr>
+      <p:grpSpPr>
+        <a:xfrm>
+          <a:off x="0" y="0"/>
+          <a:ext cx="0" cy="0"/>
+          <a:chOff x="0" y="0"/>
+          <a:chExt cx="0" cy="0"/>
+        </a:xfrm>
+      </p:grpSpPr>
+      <p:sp>
+        <p:nvSpPr>
+          <p:cNvPr id="1124" name="Google Shape;1124;p91"/>
+          <p:cNvSpPr txBox="1">
+            <a:spLocks noGrp="1"/>
+          </p:cNvSpPr>
+          <p:nvPr>
+            <p:ph type="title"/>
+          </p:nvPr>
+        </p:nvSpPr>
+        <p:spPr>
+          <a:xfrm>
+            <a:off x="4996075" y="999550"/>
+            <a:ext cx="2225992" cy="534082"/>
+          </a:xfrm>
+          <a:prstGeom prst="rect">
+            <a:avLst/>
+          </a:prstGeom>
+        </p:spPr>
+        <p:txBody>
+          <a:bodyPr spcFirstLastPara="1" wrap="square" lIns="91425" tIns="91425" rIns="91425" bIns="91425" anchor="t" anchorCtr="0">
+            <a:noAutofit/>
+          </a:bodyPr>
+          <a:lstStyle/>
+          <a:p>
+            <a:pPr marL="0" lvl="0" indent="0" algn="l" rtl="0">
+              <a:spcBef>
+                <a:spcPts val="0"/>
+              </a:spcBef>
+              <a:spcAft>
+                <a:spcPts val="0"/>
+              </a:spcAft>
+              <a:buNone/>
+            </a:pPr>
+            <a:r>
+              <a:rPr lang="hu-HU" dirty="0"/>
+              <a:t>Kódrészletek:</a:t>
+            </a:r>
+            <a:endParaRPr dirty="0"/>
+          </a:p>
+        </p:txBody>
+      </p:sp>
+      <p:pic>
+        <p:nvPicPr>
+          <p:cNvPr id="1125" name="Google Shape;1125;p91"/>
+          <p:cNvPicPr preferRelativeResize="0"/>
+          <p:nvPr/>
+        </p:nvPicPr>
+        <p:blipFill>
+          <a:blip r:embed="rId3">
+            <a:alphaModFix amt="56000"/>
+          </a:blip>
+          <a:stretch>
+            <a:fillRect/>
+          </a:stretch>
+        </p:blipFill>
+        <p:spPr>
+          <a:xfrm rot="10800000">
+            <a:off x="4943061" y="1501016"/>
+            <a:ext cx="2505700" cy="282325"/>
+          </a:xfrm>
+          <a:prstGeom prst="rect">
+            <a:avLst/>
+          </a:prstGeom>
+          <a:noFill/>
+          <a:ln>
+            <a:noFill/>
+          </a:ln>
+        </p:spPr>
+      </p:pic>
+      <p:pic>
+        <p:nvPicPr>
+          <p:cNvPr id="4" name="Kép 3">
+            <a:extLst>
+              <a:ext uri="{FF2B5EF4-FFF2-40B4-BE49-F238E27FC236}">
+                <a16:creationId xmlns:a16="http://schemas.microsoft.com/office/drawing/2014/main" id="{663EA9AD-E1F5-8D25-3FC6-BEF9F3A9B961}"/>
+              </a:ext>
+            </a:extLst>
+          </p:cNvPr>
+          <p:cNvPicPr>
+            <a:picLocks noChangeAspect="1"/>
+          </p:cNvPicPr>
+          <p:nvPr/>
+        </p:nvPicPr>
+        <p:blipFill>
+          <a:blip r:embed="rId4"/>
+          <a:stretch>
+            <a:fillRect/>
+          </a:stretch>
+        </p:blipFill>
+        <p:spPr>
+          <a:xfrm>
+            <a:off x="4651412" y="1842006"/>
+            <a:ext cx="2181529" cy="1638529"/>
+          </a:xfrm>
+          <a:prstGeom prst="rect">
+            <a:avLst/>
+          </a:prstGeom>
+        </p:spPr>
+      </p:pic>
+      <p:pic>
+        <p:nvPicPr>
+          <p:cNvPr id="6" name="Kép 5">
+            <a:extLst>
+              <a:ext uri="{FF2B5EF4-FFF2-40B4-BE49-F238E27FC236}">
+                <a16:creationId xmlns:a16="http://schemas.microsoft.com/office/drawing/2014/main" id="{77B87A1C-C242-EAC4-ADB7-DEAF9FAABD10}"/>
+              </a:ext>
+            </a:extLst>
+          </p:cNvPr>
+          <p:cNvPicPr>
+            <a:picLocks noChangeAspect="1"/>
+          </p:cNvPicPr>
+          <p:nvPr/>
+        </p:nvPicPr>
+        <p:blipFill>
+          <a:blip r:embed="rId5"/>
+          <a:stretch>
+            <a:fillRect/>
+          </a:stretch>
+        </p:blipFill>
+        <p:spPr>
+          <a:xfrm>
+            <a:off x="4651412" y="3645991"/>
+            <a:ext cx="3640503" cy="330643"/>
+          </a:xfrm>
+          <a:prstGeom prst="rect">
+            <a:avLst/>
+          </a:prstGeom>
+        </p:spPr>
+      </p:pic>
+      <p:pic>
+        <p:nvPicPr>
+          <p:cNvPr id="4098" name="Picture 2" descr="FUNNY FACES | Blurry but happy. Mr. onetooth. Photo taken in… | Flickr">
+            <a:extLst>
+              <a:ext uri="{FF2B5EF4-FFF2-40B4-BE49-F238E27FC236}">
+                <a16:creationId xmlns:a16="http://schemas.microsoft.com/office/drawing/2014/main" id="{2D05A45E-324C-B803-D52D-42AE03F81980}"/>
+              </a:ext>
+            </a:extLst>
+          </p:cNvPr>
+          <p:cNvPicPr>
+            <a:picLocks noChangeAspect="1" noChangeArrowheads="1"/>
+          </p:cNvPicPr>
+          <p:nvPr/>
+        </p:nvPicPr>
+        <p:blipFill>
+          <a:blip r:embed="rId6">
+            <a:extLst>
+              <a:ext uri="{28A0092B-C50C-407E-A947-70E740481C1C}">
+                <a14:useLocalDpi xmlns:a14="http://schemas.microsoft.com/office/drawing/2010/main" val="0"/>
+              </a:ext>
+            </a:extLst>
+          </a:blip>
+          <a:srcRect/>
+          <a:stretch>
+            <a:fillRect/>
+          </a:stretch>
+        </p:blipFill>
+        <p:spPr bwMode="auto">
+          <a:xfrm>
+            <a:off x="71362" y="81643"/>
+            <a:ext cx="4500638" cy="4980214"/>
+          </a:xfrm>
+          <a:prstGeom prst="rect">
+            <a:avLst/>
+          </a:prstGeom>
+          <a:noFill/>
+          <a:extLst>
+            <a:ext uri="{909E8E84-426E-40DD-AFC4-6F175D3DCCD1}">
+              <a14:hiddenFill xmlns:a14="http://schemas.microsoft.com/office/drawing/2010/main">
+                <a:solidFill>
+                  <a:srgbClr val="FFFFFF"/>
+                </a:solidFill>
+              </a14:hiddenFill>
+            </a:ext>
+          </a:extLst>
+        </p:spPr>
+      </p:pic>
+    </p:spTree>
+    <p:extLst>
+      <p:ext uri="{BB962C8B-B14F-4D97-AF65-F5344CB8AC3E}">
+        <p14:creationId xmlns:p14="http://schemas.microsoft.com/office/powerpoint/2010/main" val="3107160901"/>
+      </p:ext>
+    </p:extLst>
+  </p:cSld>
+  <p:clrMapOvr>
+    <a:masterClrMapping/>
+  </p:clrMapOvr>
+</p:sld>
+</file>
+
+<file path=ppt/slides/slide8.xml><?xml version="1.0" encoding="utf-8"?>
 <p:sld xmlns:a="http://schemas.openxmlformats.org/drawingml/2006/main" xmlns:r="http://schemas.openxmlformats.org/officeDocument/2006/relationships" xmlns:p="http://schemas.openxmlformats.org/presentationml/2006/main">
   <p:cSld>
     <p:spTree>
@@ -9976,15 +8594,260 @@
             <p:ph type="title"/>
           </p:nvPr>
         </p:nvSpPr>
-        <p:spPr/>
+        <p:spPr>
+          <a:xfrm rot="877333">
+            <a:off x="6186487" y="194043"/>
+            <a:ext cx="2490343" cy="1725508"/>
+          </a:xfrm>
+        </p:spPr>
         <p:txBody>
           <a:bodyPr/>
           <a:lstStyle/>
           <a:p>
-            <a:endParaRPr lang="hu-HU"/>
+            <a:r>
+              <a:rPr lang="hu-HU" dirty="0"/>
+              <a:t>Ami megmutatkozik a projektünkben:</a:t>
+            </a:r>
           </a:p>
         </p:txBody>
       </p:sp>
+      <p:sp>
+        <p:nvSpPr>
+          <p:cNvPr id="4" name="Szövegdoboz 3">
+            <a:extLst>
+              <a:ext uri="{FF2B5EF4-FFF2-40B4-BE49-F238E27FC236}">
+                <a16:creationId xmlns:a16="http://schemas.microsoft.com/office/drawing/2014/main" id="{10D28B9E-B126-7B5F-2331-C80727CAA48D}"/>
+              </a:ext>
+            </a:extLst>
+          </p:cNvPr>
+          <p:cNvSpPr txBox="1"/>
+          <p:nvPr/>
+        </p:nvSpPr>
+        <p:spPr>
+          <a:xfrm>
+            <a:off x="69816" y="399227"/>
+            <a:ext cx="5881255" cy="707886"/>
+          </a:xfrm>
+          <a:prstGeom prst="rect">
+            <a:avLst/>
+          </a:prstGeom>
+          <a:noFill/>
+        </p:spPr>
+        <p:txBody>
+          <a:bodyPr wrap="square">
+            <a:spAutoFit/>
+          </a:bodyPr>
+          <a:lstStyle/>
+          <a:p>
+            <a:pPr marL="0" lvl="0" indent="0" algn="ctr" rtl="0">
+              <a:spcBef>
+                <a:spcPts val="0"/>
+              </a:spcBef>
+              <a:spcAft>
+                <a:spcPts val="0"/>
+              </a:spcAft>
+              <a:buNone/>
+            </a:pPr>
+            <a:r>
+              <a:rPr lang="hu-HU" sz="4000" dirty="0">
+                <a:solidFill>
+                  <a:schemeClr val="accent2"/>
+                </a:solidFill>
+                <a:latin typeface="Concert One" pitchFamily="2" charset="0"/>
+              </a:rPr>
+              <a:t>Köszönöm a figyelmet!</a:t>
+            </a:r>
+          </a:p>
+        </p:txBody>
+      </p:sp>
+      <p:pic>
+        <p:nvPicPr>
+          <p:cNvPr id="1026" name="Picture 2" descr="Csapatmunka - KaticaMatrica.hu - A minőségi falmatrica / faltetoválás és  vászonkép webáruház és online bolt">
+            <a:extLst>
+              <a:ext uri="{FF2B5EF4-FFF2-40B4-BE49-F238E27FC236}">
+                <a16:creationId xmlns:a16="http://schemas.microsoft.com/office/drawing/2014/main" id="{C23E9EE9-6DE1-A854-FB44-6EF916328E8C}"/>
+              </a:ext>
+            </a:extLst>
+          </p:cNvPr>
+          <p:cNvPicPr>
+            <a:picLocks noChangeAspect="1" noChangeArrowheads="1"/>
+          </p:cNvPicPr>
+          <p:nvPr/>
+        </p:nvPicPr>
+        <p:blipFill>
+          <a:blip r:embed="rId2">
+            <a:extLst>
+              <a:ext uri="{28A0092B-C50C-407E-A947-70E740481C1C}">
+                <a14:useLocalDpi xmlns:a14="http://schemas.microsoft.com/office/drawing/2010/main" val="0"/>
+              </a:ext>
+            </a:extLst>
+          </a:blip>
+          <a:srcRect/>
+          <a:stretch>
+            <a:fillRect/>
+          </a:stretch>
+        </p:blipFill>
+        <p:spPr bwMode="auto">
+          <a:xfrm>
+            <a:off x="289701" y="1151874"/>
+            <a:ext cx="2249950" cy="2249950"/>
+          </a:xfrm>
+          <a:prstGeom prst="rect">
+            <a:avLst/>
+          </a:prstGeom>
+          <a:noFill/>
+          <a:extLst>
+            <a:ext uri="{909E8E84-426E-40DD-AFC4-6F175D3DCCD1}">
+              <a14:hiddenFill xmlns:a14="http://schemas.microsoft.com/office/drawing/2010/main">
+                <a:solidFill>
+                  <a:srgbClr val="FFFFFF"/>
+                </a:solidFill>
+              </a14:hiddenFill>
+            </a:ext>
+          </a:extLst>
+        </p:spPr>
+      </p:pic>
+      <p:pic>
+        <p:nvPicPr>
+          <p:cNvPr id="1028" name="Picture 4" descr="Clean Code: A Handbook of Agile Software Craftsmanship: Martin, Robert:  9780132350884: Books - Amazon.ca">
+            <a:extLst>
+              <a:ext uri="{FF2B5EF4-FFF2-40B4-BE49-F238E27FC236}">
+                <a16:creationId xmlns:a16="http://schemas.microsoft.com/office/drawing/2014/main" id="{B31FEB89-FDCB-75C7-4901-E16D690DB070}"/>
+              </a:ext>
+            </a:extLst>
+          </p:cNvPr>
+          <p:cNvPicPr>
+            <a:picLocks noChangeAspect="1" noChangeArrowheads="1"/>
+          </p:cNvPicPr>
+          <p:nvPr/>
+        </p:nvPicPr>
+        <p:blipFill>
+          <a:blip r:embed="rId3">
+            <a:extLst>
+              <a:ext uri="{28A0092B-C50C-407E-A947-70E740481C1C}">
+                <a14:useLocalDpi xmlns:a14="http://schemas.microsoft.com/office/drawing/2010/main" val="0"/>
+              </a:ext>
+            </a:extLst>
+          </a:blip>
+          <a:srcRect/>
+          <a:stretch>
+            <a:fillRect/>
+          </a:stretch>
+        </p:blipFill>
+        <p:spPr bwMode="auto">
+          <a:xfrm>
+            <a:off x="3066052" y="1151874"/>
+            <a:ext cx="2123208" cy="2808476"/>
+          </a:xfrm>
+          <a:prstGeom prst="rect">
+            <a:avLst/>
+          </a:prstGeom>
+          <a:noFill/>
+          <a:extLst>
+            <a:ext uri="{909E8E84-426E-40DD-AFC4-6F175D3DCCD1}">
+              <a14:hiddenFill xmlns:a14="http://schemas.microsoft.com/office/drawing/2010/main">
+                <a:solidFill>
+                  <a:srgbClr val="FFFFFF"/>
+                </a:solidFill>
+              </a14:hiddenFill>
+            </a:ext>
+          </a:extLst>
+        </p:spPr>
+      </p:pic>
+      <p:pic>
+        <p:nvPicPr>
+          <p:cNvPr id="1030" name="Picture 6" descr="Pacek – Vulkán (2015, CD) - Discogs">
+            <a:extLst>
+              <a:ext uri="{FF2B5EF4-FFF2-40B4-BE49-F238E27FC236}">
+                <a16:creationId xmlns:a16="http://schemas.microsoft.com/office/drawing/2014/main" id="{092EB098-1237-28BA-7276-A7FAFA602745}"/>
+              </a:ext>
+            </a:extLst>
+          </p:cNvPr>
+          <p:cNvPicPr>
+            <a:picLocks noChangeAspect="1" noChangeArrowheads="1"/>
+          </p:cNvPicPr>
+          <p:nvPr/>
+        </p:nvPicPr>
+        <p:blipFill>
+          <a:blip r:embed="rId4">
+            <a:extLst>
+              <a:ext uri="{28A0092B-C50C-407E-A947-70E740481C1C}">
+                <a14:useLocalDpi xmlns:a14="http://schemas.microsoft.com/office/drawing/2010/main" val="0"/>
+              </a:ext>
+            </a:extLst>
+          </a:blip>
+          <a:srcRect/>
+          <a:stretch>
+            <a:fillRect/>
+          </a:stretch>
+        </p:blipFill>
+        <p:spPr bwMode="auto">
+          <a:xfrm>
+            <a:off x="5951071" y="2439547"/>
+            <a:ext cx="2249950" cy="2249950"/>
+          </a:xfrm>
+          <a:prstGeom prst="rect">
+            <a:avLst/>
+          </a:prstGeom>
+          <a:noFill/>
+          <a:extLst>
+            <a:ext uri="{909E8E84-426E-40DD-AFC4-6F175D3DCCD1}">
+              <a14:hiddenFill xmlns:a14="http://schemas.microsoft.com/office/drawing/2010/main">
+                <a:solidFill>
+                  <a:srgbClr val="FFFFFF"/>
+                </a:solidFill>
+              </a14:hiddenFill>
+            </a:ext>
+          </a:extLst>
+        </p:spPr>
+      </p:pic>
+      <p:pic>
+        <p:nvPicPr>
+          <p:cNvPr id="1032" name="Picture 8" descr="ahol a pacek a stil｜TikTok Keresés">
+            <a:extLst>
+              <a:ext uri="{FF2B5EF4-FFF2-40B4-BE49-F238E27FC236}">
+                <a16:creationId xmlns:a16="http://schemas.microsoft.com/office/drawing/2014/main" id="{9FBF0FD7-D627-3927-860A-E5C292F8DF1F}"/>
+              </a:ext>
+            </a:extLst>
+          </p:cNvPr>
+          <p:cNvPicPr>
+            <a:picLocks noChangeAspect="1" noChangeArrowheads="1"/>
+          </p:cNvPicPr>
+          <p:nvPr/>
+        </p:nvPicPr>
+        <p:blipFill>
+          <a:blip r:embed="rId5">
+            <a:extLst>
+              <a:ext uri="{28A0092B-C50C-407E-A947-70E740481C1C}">
+                <a14:useLocalDpi xmlns:a14="http://schemas.microsoft.com/office/drawing/2010/main" val="0"/>
+              </a:ext>
+            </a:extLst>
+          </a:blip>
+          <a:srcRect/>
+          <a:stretch>
+            <a:fillRect/>
+          </a:stretch>
+        </p:blipFill>
+        <p:spPr bwMode="auto">
+          <a:xfrm>
+            <a:off x="239152" y="3156910"/>
+            <a:ext cx="1806919" cy="1798888"/>
+          </a:xfrm>
+          <a:prstGeom prst="rect">
+            <a:avLst/>
+          </a:prstGeom>
+          <a:noFill/>
+          <a:extLst>
+            <a:ext uri="{909E8E84-426E-40DD-AFC4-6F175D3DCCD1}">
+              <a14:hiddenFill xmlns:a14="http://schemas.microsoft.com/office/drawing/2010/main">
+                <a:solidFill>
+                  <a:srgbClr val="FFFFFF"/>
+                </a:solidFill>
+              </a14:hiddenFill>
+            </a:ext>
+          </a:extLst>
+        </p:spPr>
+      </p:pic>
     </p:spTree>
     <p:extLst>
       <p:ext uri="{BB962C8B-B14F-4D97-AF65-F5344CB8AC3E}">

</xml_diff>